<commit_message>
Cover page updates(release version and publication date)
</commit_message>
<xml_diff>
--- a/sources/vol1-diagram-sdpi-profiles.pptx
+++ b/sources/vol1-diagram-sdpi-profiles.pptx
@@ -112,6 +112,291 @@
 </p:presentation>
 </file>
 
+<file path=ppt/changesInfos/changesInfo1.xml><?xml version="1.0" encoding="utf-8"?>
+<pc:chgInfo xmlns:a="http://schemas.openxmlformats.org/drawingml/2006/main" xmlns:r="http://schemas.openxmlformats.org/officeDocument/2006/relationships" xmlns:ac="http://schemas.microsoft.com/office/drawing/2013/main/command" xmlns:pc="http://schemas.microsoft.com/office/powerpoint/2013/main/command">
+  <pc:docChgLst>
+    <pc:chgData name="Espina Perez, Javier" userId="21026bb2-5a6b-4dc0-9f38-b05e8fbcde9c" providerId="ADAL" clId="{8DADF8CC-3600-416D-A641-D1A778A57480}"/>
+    <pc:docChg chg="undo custSel modSld">
+      <pc:chgData name="Espina Perez, Javier" userId="21026bb2-5a6b-4dc0-9f38-b05e8fbcde9c" providerId="ADAL" clId="{8DADF8CC-3600-416D-A641-D1A778A57480}" dt="2025-11-07T14:55:04.268" v="345" actId="14100"/>
+      <pc:docMkLst>
+        <pc:docMk/>
+      </pc:docMkLst>
+      <pc:sldChg chg="addSp delSp modSp mod addAnim delAnim modAnim">
+        <pc:chgData name="Espina Perez, Javier" userId="21026bb2-5a6b-4dc0-9f38-b05e8fbcde9c" providerId="ADAL" clId="{8DADF8CC-3600-416D-A641-D1A778A57480}" dt="2025-11-07T14:55:04.268" v="345" actId="14100"/>
+        <pc:sldMkLst>
+          <pc:docMk/>
+          <pc:sldMk cId="850373823" sldId="289"/>
+        </pc:sldMkLst>
+        <pc:spChg chg="add del mod">
+          <ac:chgData name="Espina Perez, Javier" userId="21026bb2-5a6b-4dc0-9f38-b05e8fbcde9c" providerId="ADAL" clId="{8DADF8CC-3600-416D-A641-D1A778A57480}" dt="2025-11-07T14:47:02.575" v="336" actId="478"/>
+          <ac:spMkLst>
+            <pc:docMk/>
+            <pc:sldMk cId="850373823" sldId="289"/>
+            <ac:spMk id="2" creationId="{F4CA7617-7799-A596-C699-CDE9866C2ABA}"/>
+          </ac:spMkLst>
+        </pc:spChg>
+        <pc:spChg chg="add del mod">
+          <ac:chgData name="Espina Perez, Javier" userId="21026bb2-5a6b-4dc0-9f38-b05e8fbcde9c" providerId="ADAL" clId="{8DADF8CC-3600-416D-A641-D1A778A57480}" dt="2025-11-07T14:38:34.519" v="315" actId="2085"/>
+          <ac:spMkLst>
+            <pc:docMk/>
+            <pc:sldMk cId="850373823" sldId="289"/>
+            <ac:spMk id="3" creationId="{65FF9B69-A599-4EDE-394E-50092FE13630}"/>
+          </ac:spMkLst>
+        </pc:spChg>
+        <pc:spChg chg="mod">
+          <ac:chgData name="Espina Perez, Javier" userId="21026bb2-5a6b-4dc0-9f38-b05e8fbcde9c" providerId="ADAL" clId="{8DADF8CC-3600-416D-A641-D1A778A57480}" dt="2025-10-17T09:58:16.439" v="18" actId="20577"/>
+          <ac:spMkLst>
+            <pc:docMk/>
+            <pc:sldMk cId="850373823" sldId="289"/>
+            <ac:spMk id="6" creationId="{589A218D-E265-FA36-091B-8B6E7AE6A674}"/>
+          </ac:spMkLst>
+        </pc:spChg>
+        <pc:spChg chg="mod">
+          <ac:chgData name="Espina Perez, Javier" userId="21026bb2-5a6b-4dc0-9f38-b05e8fbcde9c" providerId="ADAL" clId="{8DADF8CC-3600-416D-A641-D1A778A57480}" dt="2025-10-17T09:58:19.133" v="19" actId="20577"/>
+          <ac:spMkLst>
+            <pc:docMk/>
+            <pc:sldMk cId="850373823" sldId="289"/>
+            <ac:spMk id="7" creationId="{75F3BD69-2340-1867-1DD3-2EE46B319E00}"/>
+          </ac:spMkLst>
+        </pc:spChg>
+        <pc:spChg chg="mod">
+          <ac:chgData name="Espina Perez, Javier" userId="21026bb2-5a6b-4dc0-9f38-b05e8fbcde9c" providerId="ADAL" clId="{8DADF8CC-3600-416D-A641-D1A778A57480}" dt="2025-11-07T14:40:47.197" v="325" actId="692"/>
+          <ac:spMkLst>
+            <pc:docMk/>
+            <pc:sldMk cId="850373823" sldId="289"/>
+            <ac:spMk id="8" creationId="{D6E45C1F-6931-7EDD-E880-BBC91A5EAAFE}"/>
+          </ac:spMkLst>
+        </pc:spChg>
+        <pc:spChg chg="mod">
+          <ac:chgData name="Espina Perez, Javier" userId="21026bb2-5a6b-4dc0-9f38-b05e8fbcde9c" providerId="ADAL" clId="{8DADF8CC-3600-416D-A641-D1A778A57480}" dt="2025-11-07T14:39:44.065" v="322" actId="207"/>
+          <ac:spMkLst>
+            <pc:docMk/>
+            <pc:sldMk cId="850373823" sldId="289"/>
+            <ac:spMk id="13" creationId="{2CFBCCB6-EB8A-7A54-7816-9282970ADACE}"/>
+          </ac:spMkLst>
+        </pc:spChg>
+        <pc:spChg chg="mod">
+          <ac:chgData name="Espina Perez, Javier" userId="21026bb2-5a6b-4dc0-9f38-b05e8fbcde9c" providerId="ADAL" clId="{8DADF8CC-3600-416D-A641-D1A778A57480}" dt="2025-11-05T10:02:39.342" v="176" actId="1037"/>
+          <ac:spMkLst>
+            <pc:docMk/>
+            <pc:sldMk cId="850373823" sldId="289"/>
+            <ac:spMk id="14" creationId="{57C8BA0E-C07C-7998-38A2-106DB39377B4}"/>
+          </ac:spMkLst>
+        </pc:spChg>
+        <pc:spChg chg="mod">
+          <ac:chgData name="Espina Perez, Javier" userId="21026bb2-5a6b-4dc0-9f38-b05e8fbcde9c" providerId="ADAL" clId="{8DADF8CC-3600-416D-A641-D1A778A57480}" dt="2025-11-05T10:06:12.106" v="206" actId="20577"/>
+          <ac:spMkLst>
+            <pc:docMk/>
+            <pc:sldMk cId="850373823" sldId="289"/>
+            <ac:spMk id="15" creationId="{DAD2915A-3EBD-C8E5-1290-79CDF03B1063}"/>
+          </ac:spMkLst>
+        </pc:spChg>
+        <pc:spChg chg="mod">
+          <ac:chgData name="Espina Perez, Javier" userId="21026bb2-5a6b-4dc0-9f38-b05e8fbcde9c" providerId="ADAL" clId="{8DADF8CC-3600-416D-A641-D1A778A57480}" dt="2025-11-07T14:54:57.318" v="343" actId="14100"/>
+          <ac:spMkLst>
+            <pc:docMk/>
+            <pc:sldMk cId="850373823" sldId="289"/>
+            <ac:spMk id="16" creationId="{5D8CCF33-0398-C57B-EBA3-5C8C225DD4CA}"/>
+          </ac:spMkLst>
+        </pc:spChg>
+        <pc:spChg chg="mod">
+          <ac:chgData name="Espina Perez, Javier" userId="21026bb2-5a6b-4dc0-9f38-b05e8fbcde9c" providerId="ADAL" clId="{8DADF8CC-3600-416D-A641-D1A778A57480}" dt="2025-11-07T14:55:00.953" v="344" actId="14100"/>
+          <ac:spMkLst>
+            <pc:docMk/>
+            <pc:sldMk cId="850373823" sldId="289"/>
+            <ac:spMk id="17" creationId="{FDEA11C8-2DB0-3AB0-9E6F-553C3C1F5577}"/>
+          </ac:spMkLst>
+        </pc:spChg>
+        <pc:spChg chg="mod">
+          <ac:chgData name="Espina Perez, Javier" userId="21026bb2-5a6b-4dc0-9f38-b05e8fbcde9c" providerId="ADAL" clId="{8DADF8CC-3600-416D-A641-D1A778A57480}" dt="2025-11-05T10:02:39.342" v="176" actId="1037"/>
+          <ac:spMkLst>
+            <pc:docMk/>
+            <pc:sldMk cId="850373823" sldId="289"/>
+            <ac:spMk id="18" creationId="{CF8EAEFF-6A61-520A-5517-72C032F92E4D}"/>
+          </ac:spMkLst>
+        </pc:spChg>
+        <pc:spChg chg="mod">
+          <ac:chgData name="Espina Perez, Javier" userId="21026bb2-5a6b-4dc0-9f38-b05e8fbcde9c" providerId="ADAL" clId="{8DADF8CC-3600-416D-A641-D1A778A57480}" dt="2025-11-05T10:02:39.342" v="176" actId="1037"/>
+          <ac:spMkLst>
+            <pc:docMk/>
+            <pc:sldMk cId="850373823" sldId="289"/>
+            <ac:spMk id="19" creationId="{6AAD8503-1255-648D-D1EF-1B2C37B6B855}"/>
+          </ac:spMkLst>
+        </pc:spChg>
+        <pc:spChg chg="mod">
+          <ac:chgData name="Espina Perez, Javier" userId="21026bb2-5a6b-4dc0-9f38-b05e8fbcde9c" providerId="ADAL" clId="{8DADF8CC-3600-416D-A641-D1A778A57480}" dt="2025-11-05T10:02:39.342" v="176" actId="1037"/>
+          <ac:spMkLst>
+            <pc:docMk/>
+            <pc:sldMk cId="850373823" sldId="289"/>
+            <ac:spMk id="25" creationId="{7C826CE6-E53A-1373-A9F0-DA4EA1BF6A39}"/>
+          </ac:spMkLst>
+        </pc:spChg>
+        <pc:spChg chg="mod">
+          <ac:chgData name="Espina Perez, Javier" userId="21026bb2-5a6b-4dc0-9f38-b05e8fbcde9c" providerId="ADAL" clId="{8DADF8CC-3600-416D-A641-D1A778A57480}" dt="2025-11-05T10:25:12.766" v="307" actId="14100"/>
+          <ac:spMkLst>
+            <pc:docMk/>
+            <pc:sldMk cId="850373823" sldId="289"/>
+            <ac:spMk id="32" creationId="{2B2E7B30-D35D-A3FD-AF20-E9088E9CF3B0}"/>
+          </ac:spMkLst>
+        </pc:spChg>
+        <pc:spChg chg="mod">
+          <ac:chgData name="Espina Perez, Javier" userId="21026bb2-5a6b-4dc0-9f38-b05e8fbcde9c" providerId="ADAL" clId="{8DADF8CC-3600-416D-A641-D1A778A57480}" dt="2025-11-05T10:24:36.787" v="304" actId="1076"/>
+          <ac:spMkLst>
+            <pc:docMk/>
+            <pc:sldMk cId="850373823" sldId="289"/>
+            <ac:spMk id="33" creationId="{96729C0E-9B14-9C5D-8B76-4E0B7B7ED0F6}"/>
+          </ac:spMkLst>
+        </pc:spChg>
+        <pc:spChg chg="add del mod">
+          <ac:chgData name="Espina Perez, Javier" userId="21026bb2-5a6b-4dc0-9f38-b05e8fbcde9c" providerId="ADAL" clId="{8DADF8CC-3600-416D-A641-D1A778A57480}" dt="2025-11-07T14:37:57.338" v="312" actId="478"/>
+          <ac:spMkLst>
+            <pc:docMk/>
+            <pc:sldMk cId="850373823" sldId="289"/>
+            <ac:spMk id="71" creationId="{220928F7-E48A-3FF9-566B-62C125A94255}"/>
+          </ac:spMkLst>
+        </pc:spChg>
+        <pc:cxnChg chg="mod">
+          <ac:chgData name="Espina Perez, Javier" userId="21026bb2-5a6b-4dc0-9f38-b05e8fbcde9c" providerId="ADAL" clId="{8DADF8CC-3600-416D-A641-D1A778A57480}" dt="2025-11-05T10:00:53.914" v="85" actId="692"/>
+          <ac:cxnSpMkLst>
+            <pc:docMk/>
+            <pc:sldMk cId="850373823" sldId="289"/>
+            <ac:cxnSpMk id="9" creationId="{6DD09084-8F6E-760C-48A6-734118E18E80}"/>
+          </ac:cxnSpMkLst>
+        </pc:cxnChg>
+        <pc:cxnChg chg="mod">
+          <ac:chgData name="Espina Perez, Javier" userId="21026bb2-5a6b-4dc0-9f38-b05e8fbcde9c" providerId="ADAL" clId="{8DADF8CC-3600-416D-A641-D1A778A57480}" dt="2025-11-05T10:00:53.914" v="85" actId="692"/>
+          <ac:cxnSpMkLst>
+            <pc:docMk/>
+            <pc:sldMk cId="850373823" sldId="289"/>
+            <ac:cxnSpMk id="10" creationId="{D963D5E3-F75B-2F5A-F341-E8E85B7E22BF}"/>
+          </ac:cxnSpMkLst>
+        </pc:cxnChg>
+        <pc:cxnChg chg="mod">
+          <ac:chgData name="Espina Perez, Javier" userId="21026bb2-5a6b-4dc0-9f38-b05e8fbcde9c" providerId="ADAL" clId="{8DADF8CC-3600-416D-A641-D1A778A57480}" dt="2025-11-05T10:00:53.914" v="85" actId="692"/>
+          <ac:cxnSpMkLst>
+            <pc:docMk/>
+            <pc:sldMk cId="850373823" sldId="289"/>
+            <ac:cxnSpMk id="11" creationId="{2AD97EC3-63D1-8EA0-5C50-4CE57F2EAD70}"/>
+          </ac:cxnSpMkLst>
+        </pc:cxnChg>
+        <pc:cxnChg chg="mod">
+          <ac:chgData name="Espina Perez, Javier" userId="21026bb2-5a6b-4dc0-9f38-b05e8fbcde9c" providerId="ADAL" clId="{8DADF8CC-3600-416D-A641-D1A778A57480}" dt="2025-11-07T14:55:00.953" v="344" actId="14100"/>
+          <ac:cxnSpMkLst>
+            <pc:docMk/>
+            <pc:sldMk cId="850373823" sldId="289"/>
+            <ac:cxnSpMk id="22" creationId="{F06B9044-C732-3AA3-044F-1BC0B3672C33}"/>
+          </ac:cxnSpMkLst>
+        </pc:cxnChg>
+        <pc:cxnChg chg="mod">
+          <ac:chgData name="Espina Perez, Javier" userId="21026bb2-5a6b-4dc0-9f38-b05e8fbcde9c" providerId="ADAL" clId="{8DADF8CC-3600-416D-A641-D1A778A57480}" dt="2025-11-05T10:03:03.320" v="178" actId="14100"/>
+          <ac:cxnSpMkLst>
+            <pc:docMk/>
+            <pc:sldMk cId="850373823" sldId="289"/>
+            <ac:cxnSpMk id="23" creationId="{DB943C77-21AE-FD4C-807B-91D7343875B4}"/>
+          </ac:cxnSpMkLst>
+        </pc:cxnChg>
+        <pc:cxnChg chg="mod">
+          <ac:chgData name="Espina Perez, Javier" userId="21026bb2-5a6b-4dc0-9f38-b05e8fbcde9c" providerId="ADAL" clId="{8DADF8CC-3600-416D-A641-D1A778A57480}" dt="2025-11-05T10:03:16.609" v="181" actId="14100"/>
+          <ac:cxnSpMkLst>
+            <pc:docMk/>
+            <pc:sldMk cId="850373823" sldId="289"/>
+            <ac:cxnSpMk id="24" creationId="{2490466B-41DA-A24A-EA20-C0F5EE9396D0}"/>
+          </ac:cxnSpMkLst>
+        </pc:cxnChg>
+        <pc:cxnChg chg="mod">
+          <ac:chgData name="Espina Perez, Javier" userId="21026bb2-5a6b-4dc0-9f38-b05e8fbcde9c" providerId="ADAL" clId="{8DADF8CC-3600-416D-A641-D1A778A57480}" dt="2025-11-05T10:03:11.016" v="180" actId="14100"/>
+          <ac:cxnSpMkLst>
+            <pc:docMk/>
+            <pc:sldMk cId="850373823" sldId="289"/>
+            <ac:cxnSpMk id="26" creationId="{408E61C7-82E2-41EE-230A-A0C2E1C99C9F}"/>
+          </ac:cxnSpMkLst>
+        </pc:cxnChg>
+        <pc:cxnChg chg="mod">
+          <ac:chgData name="Espina Perez, Javier" userId="21026bb2-5a6b-4dc0-9f38-b05e8fbcde9c" providerId="ADAL" clId="{8DADF8CC-3600-416D-A641-D1A778A57480}" dt="2025-11-05T10:02:39.342" v="176" actId="1037"/>
+          <ac:cxnSpMkLst>
+            <pc:docMk/>
+            <pc:sldMk cId="850373823" sldId="289"/>
+            <ac:cxnSpMk id="27" creationId="{7D1F85A8-4CA6-E6B3-AE41-5402D7B38B87}"/>
+          </ac:cxnSpMkLst>
+        </pc:cxnChg>
+        <pc:cxnChg chg="mod">
+          <ac:chgData name="Espina Perez, Javier" userId="21026bb2-5a6b-4dc0-9f38-b05e8fbcde9c" providerId="ADAL" clId="{8DADF8CC-3600-416D-A641-D1A778A57480}" dt="2025-11-05T10:01:26.849" v="91" actId="692"/>
+          <ac:cxnSpMkLst>
+            <pc:docMk/>
+            <pc:sldMk cId="850373823" sldId="289"/>
+            <ac:cxnSpMk id="28" creationId="{CA8A985F-211A-2C31-1260-C6CA742A0307}"/>
+          </ac:cxnSpMkLst>
+        </pc:cxnChg>
+        <pc:cxnChg chg="mod">
+          <ac:chgData name="Espina Perez, Javier" userId="21026bb2-5a6b-4dc0-9f38-b05e8fbcde9c" providerId="ADAL" clId="{8DADF8CC-3600-416D-A641-D1A778A57480}" dt="2025-11-05T10:02:39.342" v="176" actId="1037"/>
+          <ac:cxnSpMkLst>
+            <pc:docMk/>
+            <pc:sldMk cId="850373823" sldId="289"/>
+            <ac:cxnSpMk id="29" creationId="{4FCD3117-A172-8146-3101-9B9069ED50A4}"/>
+          </ac:cxnSpMkLst>
+        </pc:cxnChg>
+        <pc:cxnChg chg="mod">
+          <ac:chgData name="Espina Perez, Javier" userId="21026bb2-5a6b-4dc0-9f38-b05e8fbcde9c" providerId="ADAL" clId="{8DADF8CC-3600-416D-A641-D1A778A57480}" dt="2025-11-07T14:55:04.268" v="345" actId="14100"/>
+          <ac:cxnSpMkLst>
+            <pc:docMk/>
+            <pc:sldMk cId="850373823" sldId="289"/>
+            <ac:cxnSpMk id="30" creationId="{785D081C-1C43-3A8E-ACEF-80A2327AB25C}"/>
+          </ac:cxnSpMkLst>
+        </pc:cxnChg>
+        <pc:cxnChg chg="mod">
+          <ac:chgData name="Espina Perez, Javier" userId="21026bb2-5a6b-4dc0-9f38-b05e8fbcde9c" providerId="ADAL" clId="{8DADF8CC-3600-416D-A641-D1A778A57480}" dt="2025-11-05T10:02:53.940" v="177" actId="14100"/>
+          <ac:cxnSpMkLst>
+            <pc:docMk/>
+            <pc:sldMk cId="850373823" sldId="289"/>
+            <ac:cxnSpMk id="31" creationId="{92DD48AB-A1DC-6A15-45C0-5723389F3B21}"/>
+          </ac:cxnSpMkLst>
+        </pc:cxnChg>
+        <pc:cxnChg chg="mod">
+          <ac:chgData name="Espina Perez, Javier" userId="21026bb2-5a6b-4dc0-9f38-b05e8fbcde9c" providerId="ADAL" clId="{8DADF8CC-3600-416D-A641-D1A778A57480}" dt="2025-11-05T10:25:12.766" v="307" actId="14100"/>
+          <ac:cxnSpMkLst>
+            <pc:docMk/>
+            <pc:sldMk cId="850373823" sldId="289"/>
+            <ac:cxnSpMk id="34" creationId="{627435D3-34D6-DEFC-E4FE-68DDD284F76F}"/>
+          </ac:cxnSpMkLst>
+        </pc:cxnChg>
+        <pc:cxnChg chg="add del mod">
+          <ac:chgData name="Espina Perez, Javier" userId="21026bb2-5a6b-4dc0-9f38-b05e8fbcde9c" providerId="ADAL" clId="{8DADF8CC-3600-416D-A641-D1A778A57480}" dt="2025-11-07T14:44:40.811" v="328" actId="478"/>
+          <ac:cxnSpMkLst>
+            <pc:docMk/>
+            <pc:sldMk cId="850373823" sldId="289"/>
+            <ac:cxnSpMk id="77" creationId="{723BD866-9C63-1866-B422-4AC2738388F0}"/>
+          </ac:cxnSpMkLst>
+        </pc:cxnChg>
+        <pc:cxnChg chg="add mod">
+          <ac:chgData name="Espina Perez, Javier" userId="21026bb2-5a6b-4dc0-9f38-b05e8fbcde9c" providerId="ADAL" clId="{8DADF8CC-3600-416D-A641-D1A778A57480}" dt="2025-11-07T14:54:33.240" v="341" actId="14100"/>
+          <ac:cxnSpMkLst>
+            <pc:docMk/>
+            <pc:sldMk cId="850373823" sldId="289"/>
+            <ac:cxnSpMk id="92" creationId="{5CEB89E3-06D7-CEA5-34A0-D038C8EE2F25}"/>
+          </ac:cxnSpMkLst>
+        </pc:cxnChg>
+        <pc:cxnChg chg="add mod">
+          <ac:chgData name="Espina Perez, Javier" userId="21026bb2-5a6b-4dc0-9f38-b05e8fbcde9c" providerId="ADAL" clId="{8DADF8CC-3600-416D-A641-D1A778A57480}" dt="2025-11-07T14:54:42.838" v="342" actId="14100"/>
+          <ac:cxnSpMkLst>
+            <pc:docMk/>
+            <pc:sldMk cId="850373823" sldId="289"/>
+            <ac:cxnSpMk id="93" creationId="{AC5C2B61-46C3-C616-BCA7-B9A10B5F09BB}"/>
+          </ac:cxnSpMkLst>
+        </pc:cxnChg>
+        <pc:cxnChg chg="add mod">
+          <ac:chgData name="Espina Perez, Javier" userId="21026bb2-5a6b-4dc0-9f38-b05e8fbcde9c" providerId="ADAL" clId="{8DADF8CC-3600-416D-A641-D1A778A57480}" dt="2025-11-07T14:41:19.053" v="326" actId="208"/>
+          <ac:cxnSpMkLst>
+            <pc:docMk/>
+            <pc:sldMk cId="850373823" sldId="289"/>
+            <ac:cxnSpMk id="97" creationId="{EC904554-3D84-10F8-CA85-74E78FE4AF50}"/>
+          </ac:cxnSpMkLst>
+        </pc:cxnChg>
+      </pc:sldChg>
+    </pc:docChg>
+  </pc:docChgLst>
+</pc:chgInfo>
+</file>
+
 <file path=ppt/slideLayouts/slideLayout1.xml><?xml version="1.0" encoding="utf-8"?>
 <p:sldLayout xmlns:a="http://schemas.openxmlformats.org/drawingml/2006/main" xmlns:r="http://schemas.openxmlformats.org/officeDocument/2006/relationships" xmlns:p="http://schemas.openxmlformats.org/presentationml/2006/main" type="title" preserve="1">
   <p:cSld name="Title Slide">
@@ -259,7 +544,7 @@
           <a:p>
             <a:fld id="{CEAB79FE-F2B8-4F38-B4B7-E17A89FC2611}" type="datetimeFigureOut">
               <a:rPr lang="en-US" smtClean="0"/>
-              <a:t>1/27/2023</a:t>
+              <a:t>11/7/2025</a:t>
             </a:fld>
             <a:endParaRPr lang="en-US"/>
           </a:p>
@@ -457,7 +742,7 @@
           <a:p>
             <a:fld id="{CEAB79FE-F2B8-4F38-B4B7-E17A89FC2611}" type="datetimeFigureOut">
               <a:rPr lang="en-US" smtClean="0"/>
-              <a:t>1/27/2023</a:t>
+              <a:t>11/7/2025</a:t>
             </a:fld>
             <a:endParaRPr lang="en-US"/>
           </a:p>
@@ -665,7 +950,7 @@
           <a:p>
             <a:fld id="{CEAB79FE-F2B8-4F38-B4B7-E17A89FC2611}" type="datetimeFigureOut">
               <a:rPr lang="en-US" smtClean="0"/>
-              <a:t>1/27/2023</a:t>
+              <a:t>11/7/2025</a:t>
             </a:fld>
             <a:endParaRPr lang="en-US"/>
           </a:p>
@@ -863,7 +1148,7 @@
           <a:p>
             <a:fld id="{CEAB79FE-F2B8-4F38-B4B7-E17A89FC2611}" type="datetimeFigureOut">
               <a:rPr lang="en-US" smtClean="0"/>
-              <a:t>1/27/2023</a:t>
+              <a:t>11/7/2025</a:t>
             </a:fld>
             <a:endParaRPr lang="en-US"/>
           </a:p>
@@ -1138,7 +1423,7 @@
           <a:p>
             <a:fld id="{CEAB79FE-F2B8-4F38-B4B7-E17A89FC2611}" type="datetimeFigureOut">
               <a:rPr lang="en-US" smtClean="0"/>
-              <a:t>1/27/2023</a:t>
+              <a:t>11/7/2025</a:t>
             </a:fld>
             <a:endParaRPr lang="en-US"/>
           </a:p>
@@ -1403,7 +1688,7 @@
           <a:p>
             <a:fld id="{CEAB79FE-F2B8-4F38-B4B7-E17A89FC2611}" type="datetimeFigureOut">
               <a:rPr lang="en-US" smtClean="0"/>
-              <a:t>1/27/2023</a:t>
+              <a:t>11/7/2025</a:t>
             </a:fld>
             <a:endParaRPr lang="en-US"/>
           </a:p>
@@ -1815,7 +2100,7 @@
           <a:p>
             <a:fld id="{CEAB79FE-F2B8-4F38-B4B7-E17A89FC2611}" type="datetimeFigureOut">
               <a:rPr lang="en-US" smtClean="0"/>
-              <a:t>1/27/2023</a:t>
+              <a:t>11/7/2025</a:t>
             </a:fld>
             <a:endParaRPr lang="en-US"/>
           </a:p>
@@ -1956,7 +2241,7 @@
           <a:p>
             <a:fld id="{CEAB79FE-F2B8-4F38-B4B7-E17A89FC2611}" type="datetimeFigureOut">
               <a:rPr lang="en-US" smtClean="0"/>
-              <a:t>1/27/2023</a:t>
+              <a:t>11/7/2025</a:t>
             </a:fld>
             <a:endParaRPr lang="en-US"/>
           </a:p>
@@ -2069,7 +2354,7 @@
           <a:p>
             <a:fld id="{CEAB79FE-F2B8-4F38-B4B7-E17A89FC2611}" type="datetimeFigureOut">
               <a:rPr lang="en-US" smtClean="0"/>
-              <a:t>1/27/2023</a:t>
+              <a:t>11/7/2025</a:t>
             </a:fld>
             <a:endParaRPr lang="en-US"/>
           </a:p>
@@ -2380,7 +2665,7 @@
           <a:p>
             <a:fld id="{CEAB79FE-F2B8-4F38-B4B7-E17A89FC2611}" type="datetimeFigureOut">
               <a:rPr lang="en-US" smtClean="0"/>
-              <a:t>1/27/2023</a:t>
+              <a:t>11/7/2025</a:t>
             </a:fld>
             <a:endParaRPr lang="en-US"/>
           </a:p>
@@ -2668,7 +2953,7 @@
           <a:p>
             <a:fld id="{CEAB79FE-F2B8-4F38-B4B7-E17A89FC2611}" type="datetimeFigureOut">
               <a:rPr lang="en-US" smtClean="0"/>
-              <a:t>1/27/2023</a:t>
+              <a:t>11/7/2025</a:t>
             </a:fld>
             <a:endParaRPr lang="en-US"/>
           </a:p>
@@ -2909,7 +3194,7 @@
           <a:p>
             <a:fld id="{CEAB79FE-F2B8-4F38-B4B7-E17A89FC2611}" type="datetimeFigureOut">
               <a:rPr lang="en-US" smtClean="0"/>
-              <a:t>1/27/2023</a:t>
+              <a:t>11/7/2025</a:t>
             </a:fld>
             <a:endParaRPr lang="en-US"/>
           </a:p>
@@ -3349,7 +3634,7 @@
           <a:solidFill>
             <a:srgbClr val="064578"/>
           </a:solidFill>
-          <a:ln>
+          <a:ln w="31750">
             <a:noFill/>
           </a:ln>
         </p:spPr>
@@ -3380,7 +3665,7 @@
                   <a:schemeClr val="bg1"/>
                 </a:solidFill>
               </a:rPr>
-              <a:t>IHE SDPi Profiles for “PRACtical” Device Interoperability</a:t>
+              <a:t>HL7-IHE SDPi Profiles for “PRACtical” Device Interoperability</a:t>
             </a:r>
           </a:p>
         </p:txBody>
@@ -3576,8 +3861,12 @@
           <a:p>
             <a:pPr algn="ctr"/>
             <a:r>
+              <a:rPr lang="en-US" dirty="0" err="1"/>
+              <a:t>SDPi</a:t>
+            </a:r>
+            <a:r>
               <a:rPr lang="en-US" dirty="0"/>
-              <a:t>SDPi  Reporting</a:t>
+              <a:t> Reporting</a:t>
             </a:r>
           </a:p>
           <a:p>
@@ -3640,8 +3929,12 @@
           <a:p>
             <a:pPr algn="ctr"/>
             <a:r>
+              <a:rPr lang="en-US" dirty="0" err="1"/>
+              <a:t>SDPi</a:t>
+            </a:r>
+            <a:r>
               <a:rPr lang="en-US" dirty="0"/>
-              <a:t>SDPi  Alerting</a:t>
+              <a:t> Alerting</a:t>
             </a:r>
           </a:p>
           <a:p>
@@ -3674,9 +3967,9 @@
             <a:avLst/>
           </a:prstGeom>
           <a:noFill/>
-          <a:ln>
+          <a:ln w="19050">
             <a:solidFill>
-              <a:schemeClr val="bg1"/>
+              <a:srgbClr val="92D050"/>
             </a:solidFill>
             <a:prstDash val="dash"/>
           </a:ln>
@@ -3729,7 +4022,7 @@
           <a:prstGeom prst="straightConnector1">
             <a:avLst/>
           </a:prstGeom>
-          <a:ln w="19050">
+          <a:ln w="31750">
             <a:solidFill>
               <a:schemeClr val="bg1"/>
             </a:solidFill>
@@ -3776,7 +4069,7 @@
           <a:prstGeom prst="straightConnector1">
             <a:avLst/>
           </a:prstGeom>
-          <a:ln w="19050">
+          <a:ln w="31750">
             <a:solidFill>
               <a:schemeClr val="bg1"/>
             </a:solidFill>
@@ -3822,7 +4115,7 @@
           <a:prstGeom prst="straightConnector1">
             <a:avLst/>
           </a:prstGeom>
-          <a:ln w="19050">
+          <a:ln w="31750">
             <a:solidFill>
               <a:schemeClr val="bg1"/>
             </a:solidFill>
@@ -3845,50 +4138,6 @@
           </a:fontRef>
         </p:style>
       </p:cxnSp>
-      <p:cxnSp>
-        <p:nvCxnSpPr>
-          <p:cNvPr id="12" name="Straight Arrow Connector 11">
-            <a:extLst>
-              <a:ext uri="{FF2B5EF4-FFF2-40B4-BE49-F238E27FC236}">
-                <a16:creationId xmlns:a16="http://schemas.microsoft.com/office/drawing/2014/main" id="{5CEB89E3-06D7-CEA5-34A0-D038C8EE2F25}"/>
-              </a:ext>
-            </a:extLst>
-          </p:cNvPr>
-          <p:cNvCxnSpPr>
-            <a:cxnSpLocks/>
-          </p:cNvCxnSpPr>
-          <p:nvPr/>
-        </p:nvCxnSpPr>
-        <p:spPr>
-          <a:xfrm flipH="1" flipV="1">
-            <a:off x="9346020" y="4366668"/>
-            <a:ext cx="299484" cy="368706"/>
-          </a:xfrm>
-          <a:prstGeom prst="straightConnector1">
-            <a:avLst/>
-          </a:prstGeom>
-          <a:ln w="19050">
-            <a:solidFill>
-              <a:srgbClr val="FF0000"/>
-            </a:solidFill>
-            <a:tailEnd type="triangle"/>
-          </a:ln>
-        </p:spPr>
-        <p:style>
-          <a:lnRef idx="1">
-            <a:schemeClr val="accent1"/>
-          </a:lnRef>
-          <a:fillRef idx="0">
-            <a:schemeClr val="accent1"/>
-          </a:fillRef>
-          <a:effectRef idx="0">
-            <a:schemeClr val="accent1"/>
-          </a:effectRef>
-          <a:fontRef idx="minor">
-            <a:schemeClr val="tx1"/>
-          </a:fontRef>
-        </p:style>
-      </p:cxnSp>
       <p:sp>
         <p:nvSpPr>
           <p:cNvPr id="13" name="TextBox 12">
@@ -3903,8 +4152,8 @@
         </p:nvSpPr>
         <p:spPr>
           <a:xfrm>
-            <a:off x="9448673" y="4593790"/>
-            <a:ext cx="1869694" cy="923330"/>
+            <a:off x="9878264" y="4352842"/>
+            <a:ext cx="1647952" cy="923330"/>
           </a:xfrm>
           <a:prstGeom prst="rect">
             <a:avLst/>
@@ -3921,7 +4170,7 @@
             <a:r>
               <a:rPr lang="en-US" dirty="0">
                 <a:solidFill>
-                  <a:srgbClr val="1E22AA"/>
+                  <a:srgbClr val="76A32E"/>
                 </a:solidFill>
               </a:rPr>
               <a:t>“medical” interoperability purpose</a:t>
@@ -3943,7 +4192,7 @@
         </p:nvSpPr>
         <p:spPr>
           <a:xfrm>
-            <a:off x="3049443" y="4738152"/>
+            <a:off x="2573193" y="4738152"/>
             <a:ext cx="1722475" cy="725756"/>
           </a:xfrm>
           <a:prstGeom prst="rect">
@@ -4011,7 +4260,7 @@
         </p:nvSpPr>
         <p:spPr>
           <a:xfrm>
-            <a:off x="3048243" y="5685834"/>
+            <a:off x="2571993" y="5685834"/>
             <a:ext cx="1722475" cy="725756"/>
           </a:xfrm>
           <a:prstGeom prst="rect">
@@ -4049,7 +4298,14 @@
             <a:pPr algn="ctr"/>
             <a:r>
               <a:rPr lang="en-US" dirty="0"/>
-              <a:t>FHIR Base Resources</a:t>
+              <a:t>HL7 FHIR</a:t>
+            </a:r>
+          </a:p>
+          <a:p>
+            <a:pPr algn="ctr"/>
+            <a:r>
+              <a:rPr lang="en-US" dirty="0"/>
+              <a:t>Core Resources</a:t>
             </a:r>
           </a:p>
         </p:txBody>
@@ -4068,8 +4324,8 @@
         </p:nvSpPr>
         <p:spPr>
           <a:xfrm>
-            <a:off x="7423172" y="4735374"/>
-            <a:ext cx="1722475" cy="725756"/>
+            <a:off x="6959779" y="4738152"/>
+            <a:ext cx="2671546" cy="725756"/>
           </a:xfrm>
           <a:prstGeom prst="rect">
             <a:avLst/>
@@ -4078,9 +4334,8 @@
             <a:srgbClr val="76A32E"/>
           </a:solidFill>
           <a:ln>
-            <a:solidFill>
-              <a:schemeClr val="bg1"/>
-            </a:solidFill>
+            <a:noFill/>
+            <a:prstDash val="dash"/>
           </a:ln>
         </p:spPr>
         <p:style>
@@ -4106,7 +4361,14 @@
             <a:pPr algn="ctr"/>
             <a:r>
               <a:rPr lang="en-US" dirty="0"/>
-              <a:t>SDC PKP Standards</a:t>
+              <a:t>IEEE SDC</a:t>
+            </a:r>
+          </a:p>
+          <a:p>
+            <a:pPr algn="ctr"/>
+            <a:r>
+              <a:rPr lang="en-US" dirty="0"/>
+              <a:t>PKP Standards</a:t>
             </a:r>
           </a:p>
         </p:txBody>
@@ -4125,8 +4387,8 @@
         </p:nvSpPr>
         <p:spPr>
           <a:xfrm>
-            <a:off x="7423175" y="5691282"/>
-            <a:ext cx="1722475" cy="725756"/>
+            <a:off x="6948943" y="5691282"/>
+            <a:ext cx="2682382" cy="725756"/>
           </a:xfrm>
           <a:prstGeom prst="rect">
             <a:avLst/>
@@ -4163,7 +4425,14 @@
             <a:pPr algn="ctr"/>
             <a:r>
               <a:rPr lang="en-US" dirty="0"/>
-              <a:t>SDC Core Standards</a:t>
+              <a:t>IEEE SDC</a:t>
+            </a:r>
+          </a:p>
+          <a:p>
+            <a:pPr algn="ctr"/>
+            <a:r>
+              <a:rPr lang="en-US" dirty="0"/>
+              <a:t>Core Standards</a:t>
             </a:r>
           </a:p>
         </p:txBody>
@@ -4182,7 +4451,7 @@
         </p:nvSpPr>
         <p:spPr>
           <a:xfrm>
-            <a:off x="5234760" y="4738908"/>
+            <a:off x="4758510" y="4738908"/>
             <a:ext cx="782607" cy="725756"/>
           </a:xfrm>
           <a:prstGeom prst="rect">
@@ -4220,7 +4489,7 @@
             <a:pPr algn="ctr"/>
             <a:r>
               <a:rPr lang="en-US" dirty="0"/>
-              <a:t>DEC</a:t>
+              <a:t>IHE DEC</a:t>
             </a:r>
           </a:p>
         </p:txBody>
@@ -4239,7 +4508,7 @@
         </p:nvSpPr>
         <p:spPr>
           <a:xfrm>
-            <a:off x="5234761" y="5685834"/>
+            <a:off x="4758511" y="5685834"/>
             <a:ext cx="1722475" cy="725756"/>
           </a:xfrm>
           <a:prstGeom prst="rect">
@@ -4284,97 +4553,6 @@
       </p:sp>
       <p:cxnSp>
         <p:nvCxnSpPr>
-          <p:cNvPr id="20" name="Straight Arrow Connector 19">
-            <a:extLst>
-              <a:ext uri="{FF2B5EF4-FFF2-40B4-BE49-F238E27FC236}">
-                <a16:creationId xmlns:a16="http://schemas.microsoft.com/office/drawing/2014/main" id="{AC5C2B61-46C3-C616-BCA7-B9A10B5F09BB}"/>
-              </a:ext>
-            </a:extLst>
-          </p:cNvPr>
-          <p:cNvCxnSpPr>
-            <a:cxnSpLocks/>
-            <a:stCxn id="13" idx="1"/>
-            <a:endCxn id="16" idx="3"/>
-          </p:cNvCxnSpPr>
-          <p:nvPr/>
-        </p:nvCxnSpPr>
-        <p:spPr>
-          <a:xfrm flipH="1">
-            <a:off x="9145647" y="5055455"/>
-            <a:ext cx="303026" cy="42797"/>
-          </a:xfrm>
-          <a:prstGeom prst="straightConnector1">
-            <a:avLst/>
-          </a:prstGeom>
-          <a:ln w="19050">
-            <a:solidFill>
-              <a:srgbClr val="FF0000"/>
-            </a:solidFill>
-            <a:tailEnd type="triangle"/>
-          </a:ln>
-        </p:spPr>
-        <p:style>
-          <a:lnRef idx="1">
-            <a:schemeClr val="accent1"/>
-          </a:lnRef>
-          <a:fillRef idx="0">
-            <a:schemeClr val="accent1"/>
-          </a:fillRef>
-          <a:effectRef idx="0">
-            <a:schemeClr val="accent1"/>
-          </a:effectRef>
-          <a:fontRef idx="minor">
-            <a:schemeClr val="tx1"/>
-          </a:fontRef>
-        </p:style>
-      </p:cxnSp>
-      <p:cxnSp>
-        <p:nvCxnSpPr>
-          <p:cNvPr id="21" name="Straight Arrow Connector 20">
-            <a:extLst>
-              <a:ext uri="{FF2B5EF4-FFF2-40B4-BE49-F238E27FC236}">
-                <a16:creationId xmlns:a16="http://schemas.microsoft.com/office/drawing/2014/main" id="{723BD866-9C63-1866-B422-4AC2738388F0}"/>
-              </a:ext>
-            </a:extLst>
-          </p:cNvPr>
-          <p:cNvCxnSpPr>
-            <a:cxnSpLocks/>
-            <a:endCxn id="16" idx="0"/>
-          </p:cNvCxnSpPr>
-          <p:nvPr/>
-        </p:nvCxnSpPr>
-        <p:spPr>
-          <a:xfrm>
-            <a:off x="8284408" y="4425216"/>
-            <a:ext cx="2" cy="310158"/>
-          </a:xfrm>
-          <a:prstGeom prst="straightConnector1">
-            <a:avLst/>
-          </a:prstGeom>
-          <a:ln w="19050">
-            <a:solidFill>
-              <a:srgbClr val="FF0000"/>
-            </a:solidFill>
-            <a:tailEnd type="triangle"/>
-          </a:ln>
-        </p:spPr>
-        <p:style>
-          <a:lnRef idx="1">
-            <a:schemeClr val="accent1"/>
-          </a:lnRef>
-          <a:fillRef idx="0">
-            <a:schemeClr val="accent1"/>
-          </a:fillRef>
-          <a:effectRef idx="0">
-            <a:schemeClr val="accent1"/>
-          </a:effectRef>
-          <a:fontRef idx="minor">
-            <a:schemeClr val="tx1"/>
-          </a:fontRef>
-        </p:style>
-      </p:cxnSp>
-      <p:cxnSp>
-        <p:nvCxnSpPr>
           <p:cNvPr id="22" name="Straight Arrow Connector 21">
             <a:extLst>
               <a:ext uri="{FF2B5EF4-FFF2-40B4-BE49-F238E27FC236}">
@@ -4390,16 +4568,16 @@
           <p:nvPr/>
         </p:nvCxnSpPr>
         <p:spPr>
-          <a:xfrm>
-            <a:off x="8284410" y="5461130"/>
-            <a:ext cx="3" cy="230152"/>
+          <a:xfrm flipH="1">
+            <a:off x="8290134" y="5463908"/>
+            <a:ext cx="5418" cy="227374"/>
           </a:xfrm>
           <a:prstGeom prst="straightConnector1">
             <a:avLst/>
           </a:prstGeom>
-          <a:ln w="19050">
+          <a:ln w="31750">
             <a:solidFill>
-              <a:srgbClr val="FF0000"/>
+              <a:srgbClr val="064578"/>
             </a:solidFill>
             <a:tailEnd type="triangle"/>
           </a:ln>
@@ -4435,14 +4613,14 @@
           <p:nvPr/>
         </p:nvCxnSpPr>
         <p:spPr>
-          <a:xfrm flipH="1">
-            <a:off x="5626063" y="5464664"/>
-            <a:ext cx="1" cy="281482"/>
+          <a:xfrm>
+            <a:off x="5149814" y="5464664"/>
+            <a:ext cx="0" cy="234136"/>
           </a:xfrm>
           <a:prstGeom prst="straightConnector1">
             <a:avLst/>
           </a:prstGeom>
-          <a:ln w="19050">
+          <a:ln w="12700">
             <a:solidFill>
               <a:schemeClr val="tx1"/>
             </a:solidFill>
@@ -4475,19 +4653,20 @@
           </p:cNvPr>
           <p:cNvCxnSpPr>
             <a:cxnSpLocks/>
+            <a:stCxn id="14" idx="2"/>
             <a:endCxn id="15" idx="0"/>
           </p:cNvCxnSpPr>
           <p:nvPr/>
         </p:nvCxnSpPr>
         <p:spPr>
-          <a:xfrm>
-            <a:off x="3907586" y="5415347"/>
-            <a:ext cx="1895" cy="270487"/>
+          <a:xfrm flipH="1">
+            <a:off x="3433231" y="5463908"/>
+            <a:ext cx="1200" cy="221926"/>
           </a:xfrm>
           <a:prstGeom prst="straightConnector1">
             <a:avLst/>
           </a:prstGeom>
-          <a:ln w="19050">
+          <a:ln w="12700">
             <a:solidFill>
               <a:schemeClr val="tx1"/>
             </a:solidFill>
@@ -4523,7 +4702,7 @@
         </p:nvSpPr>
         <p:spPr>
           <a:xfrm>
-            <a:off x="6174624" y="4738908"/>
+            <a:off x="5698374" y="4738908"/>
             <a:ext cx="782609" cy="725756"/>
           </a:xfrm>
           <a:prstGeom prst="rect">
@@ -4561,7 +4740,7 @@
             <a:pPr algn="ctr"/>
             <a:r>
               <a:rPr lang="en-US" dirty="0"/>
-              <a:t>ACM</a:t>
+              <a:t>IHE ACM</a:t>
             </a:r>
           </a:p>
         </p:txBody>
@@ -4577,18 +4756,19 @@
           </p:cNvPr>
           <p:cNvCxnSpPr>
             <a:cxnSpLocks/>
+            <a:stCxn id="25" idx="2"/>
           </p:cNvCxnSpPr>
           <p:nvPr/>
         </p:nvCxnSpPr>
         <p:spPr>
-          <a:xfrm flipH="1">
-            <a:off x="6637457" y="5417318"/>
-            <a:ext cx="1" cy="281482"/>
+          <a:xfrm>
+            <a:off x="6089679" y="5464664"/>
+            <a:ext cx="8213" cy="234136"/>
           </a:xfrm>
           <a:prstGeom prst="straightConnector1">
             <a:avLst/>
           </a:prstGeom>
-          <a:ln w="19050">
+          <a:ln w="12700">
             <a:solidFill>
               <a:schemeClr val="tx1"/>
             </a:solidFill>
@@ -4627,14 +4807,14 @@
           <p:nvPr/>
         </p:nvCxnSpPr>
         <p:spPr>
-          <a:xfrm>
-            <a:off x="6095999" y="4202618"/>
-            <a:ext cx="469930" cy="536290"/>
+          <a:xfrm flipH="1">
+            <a:off x="6089679" y="4202618"/>
+            <a:ext cx="6320" cy="536290"/>
           </a:xfrm>
           <a:prstGeom prst="straightConnector1">
             <a:avLst/>
           </a:prstGeom>
-          <a:ln w="19050">
+          <a:ln w="12700">
             <a:solidFill>
               <a:schemeClr val="tx1"/>
             </a:solidFill>
@@ -4679,7 +4859,7 @@
           <a:prstGeom prst="straightConnector1">
             <a:avLst/>
           </a:prstGeom>
-          <a:ln w="19050">
+          <a:ln w="12700">
             <a:solidFill>
               <a:schemeClr val="tx1"/>
             </a:solidFill>
@@ -4718,14 +4898,14 @@
           <p:nvPr/>
         </p:nvCxnSpPr>
         <p:spPr>
-          <a:xfrm>
-            <a:off x="3909483" y="4183253"/>
-            <a:ext cx="1198" cy="554899"/>
+          <a:xfrm flipH="1">
+            <a:off x="3434431" y="4183253"/>
+            <a:ext cx="475052" cy="554899"/>
           </a:xfrm>
           <a:prstGeom prst="straightConnector1">
             <a:avLst/>
           </a:prstGeom>
-          <a:ln w="19050">
+          <a:ln w="12700">
             <a:solidFill>
               <a:schemeClr val="tx1"/>
             </a:solidFill>
@@ -4764,18 +4944,18 @@
           <p:nvPr/>
         </p:nvCxnSpPr>
         <p:spPr>
-          <a:xfrm flipH="1">
-            <a:off x="9145650" y="2651525"/>
-            <a:ext cx="485675" cy="3402635"/>
+          <a:xfrm>
+            <a:off x="9631325" y="2651525"/>
+            <a:ext cx="12700" cy="3402635"/>
           </a:xfrm>
           <a:prstGeom prst="bentConnector3">
             <a:avLst>
-              <a:gd name="adj1" fmla="val -390088"/>
+              <a:gd name="adj1" fmla="val 15045283"/>
             </a:avLst>
           </a:prstGeom>
           <a:ln w="31750">
             <a:solidFill>
-              <a:srgbClr val="00B050"/>
+              <a:srgbClr val="064578"/>
             </a:solidFill>
             <a:tailEnd type="triangle"/>
           </a:ln>
@@ -4807,18 +4987,19 @@
           <p:cNvCxnSpPr>
             <a:cxnSpLocks/>
             <a:stCxn id="7" idx="2"/>
+            <a:endCxn id="14" idx="0"/>
           </p:cNvCxnSpPr>
           <p:nvPr/>
         </p:nvCxnSpPr>
         <p:spPr>
           <a:xfrm flipH="1">
-            <a:off x="4768825" y="4202618"/>
-            <a:ext cx="1327174" cy="486973"/>
+            <a:off x="3434431" y="4202618"/>
+            <a:ext cx="2661568" cy="535534"/>
           </a:xfrm>
           <a:prstGeom prst="straightConnector1">
             <a:avLst/>
           </a:prstGeom>
-          <a:ln w="19050">
+          <a:ln w="12700">
             <a:solidFill>
               <a:schemeClr val="tx1"/>
             </a:solidFill>
@@ -4854,8 +5035,8 @@
         </p:nvSpPr>
         <p:spPr>
           <a:xfrm>
-            <a:off x="2860158" y="4570056"/>
-            <a:ext cx="4259986" cy="947064"/>
+            <a:off x="2504330" y="4593790"/>
+            <a:ext cx="3997013" cy="923330"/>
           </a:xfrm>
           <a:prstGeom prst="rect">
             <a:avLst/>
@@ -4907,8 +5088,8 @@
         </p:nvSpPr>
         <p:spPr>
           <a:xfrm>
-            <a:off x="426354" y="5052469"/>
-            <a:ext cx="1869694" cy="646331"/>
+            <a:off x="930054" y="4595935"/>
+            <a:ext cx="1229080" cy="923330"/>
           </a:xfrm>
           <a:prstGeom prst="rect">
             <a:avLst/>
@@ -4923,12 +5104,8 @@
           <a:p>
             <a:pPr algn="ctr"/>
             <a:r>
-              <a:rPr lang="en-US" dirty="0">
-                <a:solidFill>
-                  <a:srgbClr val="1E22AA"/>
-                </a:solidFill>
-              </a:rPr>
-              <a:t>IHE “Gateway” Actors Defined</a:t>
+              <a:rPr lang="en-US" dirty="0"/>
+              <a:t>“Gateway” Actors Defined</a:t>
             </a:r>
           </a:p>
         </p:txBody>
@@ -4951,8 +5128,8 @@
         </p:nvCxnSpPr>
         <p:spPr>
           <a:xfrm flipV="1">
-            <a:off x="2296048" y="5043588"/>
-            <a:ext cx="564110" cy="332047"/>
+            <a:off x="2159134" y="5055455"/>
+            <a:ext cx="345196" cy="2145"/>
           </a:xfrm>
           <a:prstGeom prst="straightConnector1">
             <a:avLst/>
@@ -4960,6 +5137,138 @@
           <a:ln w="19050">
             <a:solidFill>
               <a:schemeClr val="tx1"/>
+            </a:solidFill>
+            <a:tailEnd type="triangle"/>
+          </a:ln>
+        </p:spPr>
+        <p:style>
+          <a:lnRef idx="1">
+            <a:schemeClr val="accent1"/>
+          </a:lnRef>
+          <a:fillRef idx="0">
+            <a:schemeClr val="accent1"/>
+          </a:fillRef>
+          <a:effectRef idx="0">
+            <a:schemeClr val="accent1"/>
+          </a:effectRef>
+          <a:fontRef idx="minor">
+            <a:schemeClr val="tx1"/>
+          </a:fontRef>
+        </p:style>
+      </p:cxnSp>
+      <p:cxnSp>
+        <p:nvCxnSpPr>
+          <p:cNvPr id="92" name="Straight Arrow Connector 91">
+            <a:extLst>
+              <a:ext uri="{FF2B5EF4-FFF2-40B4-BE49-F238E27FC236}">
+                <a16:creationId xmlns:a16="http://schemas.microsoft.com/office/drawing/2014/main" id="{5CEB89E3-06D7-CEA5-34A0-D038C8EE2F25}"/>
+              </a:ext>
+            </a:extLst>
+          </p:cNvPr>
+          <p:cNvCxnSpPr>
+            <a:cxnSpLocks/>
+          </p:cNvCxnSpPr>
+          <p:nvPr/>
+        </p:nvCxnSpPr>
+        <p:spPr>
+          <a:xfrm flipH="1" flipV="1">
+            <a:off x="9396065" y="4375660"/>
+            <a:ext cx="482199" cy="331029"/>
+          </a:xfrm>
+          <a:prstGeom prst="straightConnector1">
+            <a:avLst/>
+          </a:prstGeom>
+          <a:ln w="19050">
+            <a:solidFill>
+              <a:srgbClr val="92D050"/>
+            </a:solidFill>
+            <a:tailEnd type="triangle"/>
+          </a:ln>
+        </p:spPr>
+        <p:style>
+          <a:lnRef idx="1">
+            <a:schemeClr val="accent1"/>
+          </a:lnRef>
+          <a:fillRef idx="0">
+            <a:schemeClr val="accent1"/>
+          </a:fillRef>
+          <a:effectRef idx="0">
+            <a:schemeClr val="accent1"/>
+          </a:effectRef>
+          <a:fontRef idx="minor">
+            <a:schemeClr val="tx1"/>
+          </a:fontRef>
+        </p:style>
+      </p:cxnSp>
+      <p:cxnSp>
+        <p:nvCxnSpPr>
+          <p:cNvPr id="93" name="Straight Arrow Connector 92">
+            <a:extLst>
+              <a:ext uri="{FF2B5EF4-FFF2-40B4-BE49-F238E27FC236}">
+                <a16:creationId xmlns:a16="http://schemas.microsoft.com/office/drawing/2014/main" id="{AC5C2B61-46C3-C616-BCA7-B9A10B5F09BB}"/>
+              </a:ext>
+            </a:extLst>
+          </p:cNvPr>
+          <p:cNvCxnSpPr>
+            <a:cxnSpLocks/>
+          </p:cNvCxnSpPr>
+          <p:nvPr/>
+        </p:nvCxnSpPr>
+        <p:spPr>
+          <a:xfrm flipH="1">
+            <a:off x="9607488" y="4942936"/>
+            <a:ext cx="270776" cy="155316"/>
+          </a:xfrm>
+          <a:prstGeom prst="straightConnector1">
+            <a:avLst/>
+          </a:prstGeom>
+          <a:ln w="19050">
+            <a:solidFill>
+              <a:srgbClr val="92D050"/>
+            </a:solidFill>
+            <a:tailEnd type="triangle"/>
+          </a:ln>
+        </p:spPr>
+        <p:style>
+          <a:lnRef idx="1">
+            <a:schemeClr val="accent1"/>
+          </a:lnRef>
+          <a:fillRef idx="0">
+            <a:schemeClr val="accent1"/>
+          </a:fillRef>
+          <a:effectRef idx="0">
+            <a:schemeClr val="accent1"/>
+          </a:effectRef>
+          <a:fontRef idx="minor">
+            <a:schemeClr val="tx1"/>
+          </a:fontRef>
+        </p:style>
+      </p:cxnSp>
+      <p:cxnSp>
+        <p:nvCxnSpPr>
+          <p:cNvPr id="97" name="Straight Arrow Connector 96">
+            <a:extLst>
+              <a:ext uri="{FF2B5EF4-FFF2-40B4-BE49-F238E27FC236}">
+                <a16:creationId xmlns:a16="http://schemas.microsoft.com/office/drawing/2014/main" id="{EC904554-3D84-10F8-CA85-74E78FE4AF50}"/>
+              </a:ext>
+            </a:extLst>
+          </p:cNvPr>
+          <p:cNvCxnSpPr>
+            <a:cxnSpLocks/>
+          </p:cNvCxnSpPr>
+          <p:nvPr/>
+        </p:nvCxnSpPr>
+        <p:spPr>
+          <a:xfrm>
+            <a:off x="8284265" y="4493555"/>
+            <a:ext cx="7070" cy="213134"/>
+          </a:xfrm>
+          <a:prstGeom prst="straightConnector1">
+            <a:avLst/>
+          </a:prstGeom>
+          <a:ln w="31750">
+            <a:solidFill>
+              <a:srgbClr val="064578"/>
             </a:solidFill>
             <a:tailEnd type="triangle"/>
           </a:ln>
@@ -5992,7 +6301,7 @@
                                 </p:cTn>
                               </p:par>
                               <p:par>
-                                <p:cTn id="91" presetID="22" presetClass="entr" presetSubtype="4" fill="hold" nodeType="withEffect">
+                                <p:cTn id="91" presetID="22" presetClass="entr" presetSubtype="4" fill="hold" grpId="0" nodeType="withEffect">
                                   <p:stCondLst>
                                     <p:cond delay="0"/>
                                   </p:stCondLst>
@@ -6000,41 +6309,6 @@
                                     <p:set>
                                       <p:cBhvr>
                                         <p:cTn id="92" dur="1" fill="hold">
-                                          <p:stCondLst>
-                                            <p:cond delay="0"/>
-                                          </p:stCondLst>
-                                        </p:cTn>
-                                        <p:tgtEl>
-                                          <p:spTgt spid="21"/>
-                                        </p:tgtEl>
-                                        <p:attrNameLst>
-                                          <p:attrName>style.visibility</p:attrName>
-                                        </p:attrNameLst>
-                                      </p:cBhvr>
-                                      <p:to>
-                                        <p:strVal val="visible"/>
-                                      </p:to>
-                                    </p:set>
-                                    <p:animEffect transition="in" filter="wipe(down)">
-                                      <p:cBhvr>
-                                        <p:cTn id="93" dur="500"/>
-                                        <p:tgtEl>
-                                          <p:spTgt spid="21"/>
-                                        </p:tgtEl>
-                                      </p:cBhvr>
-                                    </p:animEffect>
-                                  </p:childTnLst>
-                                </p:cTn>
-                              </p:par>
-                              <p:par>
-                                <p:cTn id="94" presetID="22" presetClass="entr" presetSubtype="4" fill="hold" grpId="0" nodeType="withEffect">
-                                  <p:stCondLst>
-                                    <p:cond delay="0"/>
-                                  </p:stCondLst>
-                                  <p:childTnLst>
-                                    <p:set>
-                                      <p:cBhvr>
-                                        <p:cTn id="95" dur="1" fill="hold">
                                           <p:stCondLst>
                                             <p:cond delay="0"/>
                                           </p:stCondLst>
@@ -6052,7 +6326,7 @@
                                     </p:set>
                                     <p:animEffect transition="in" filter="wipe(down)">
                                       <p:cBhvr>
-                                        <p:cTn id="96" dur="500"/>
+                                        <p:cTn id="93" dur="500"/>
                                         <p:tgtEl>
                                           <p:spTgt spid="16"/>
                                         </p:tgtEl>
@@ -6062,14 +6336,14 @@
                                 </p:cTn>
                               </p:par>
                               <p:par>
-                                <p:cTn id="97" presetID="22" presetClass="entr" presetSubtype="4" fill="hold" nodeType="withEffect">
+                                <p:cTn id="94" presetID="22" presetClass="entr" presetSubtype="4" fill="hold" nodeType="withEffect">
                                   <p:stCondLst>
                                     <p:cond delay="0"/>
                                   </p:stCondLst>
                                   <p:childTnLst>
                                     <p:set>
                                       <p:cBhvr>
-                                        <p:cTn id="98" dur="1" fill="hold">
+                                        <p:cTn id="95" dur="1" fill="hold">
                                           <p:stCondLst>
                                             <p:cond delay="0"/>
                                           </p:stCondLst>
@@ -6087,7 +6361,7 @@
                                     </p:set>
                                     <p:animEffect transition="in" filter="wipe(down)">
                                       <p:cBhvr>
-                                        <p:cTn id="99" dur="500"/>
+                                        <p:cTn id="96" dur="500"/>
                                         <p:tgtEl>
                                           <p:spTgt spid="22"/>
                                         </p:tgtEl>
@@ -6097,14 +6371,14 @@
                                 </p:cTn>
                               </p:par>
                               <p:par>
-                                <p:cTn id="100" presetID="22" presetClass="entr" presetSubtype="4" fill="hold" grpId="0" nodeType="withEffect">
+                                <p:cTn id="97" presetID="22" presetClass="entr" presetSubtype="4" fill="hold" grpId="0" nodeType="withEffect">
                                   <p:stCondLst>
                                     <p:cond delay="0"/>
                                   </p:stCondLst>
                                   <p:childTnLst>
                                     <p:set>
                                       <p:cBhvr>
-                                        <p:cTn id="101" dur="1" fill="hold">
+                                        <p:cTn id="98" dur="1" fill="hold">
                                           <p:stCondLst>
                                             <p:cond delay="0"/>
                                           </p:stCondLst>
@@ -6122,9 +6396,44 @@
                                     </p:set>
                                     <p:animEffect transition="in" filter="wipe(down)">
                                       <p:cBhvr>
+                                        <p:cTn id="99" dur="500"/>
+                                        <p:tgtEl>
+                                          <p:spTgt spid="13"/>
+                                        </p:tgtEl>
+                                      </p:cBhvr>
+                                    </p:animEffect>
+                                  </p:childTnLst>
+                                </p:cTn>
+                              </p:par>
+                              <p:par>
+                                <p:cTn id="100" presetID="22" presetClass="entr" presetSubtype="4" fill="hold" nodeType="withEffect">
+                                  <p:stCondLst>
+                                    <p:cond delay="0"/>
+                                  </p:stCondLst>
+                                  <p:childTnLst>
+                                    <p:set>
+                                      <p:cBhvr>
+                                        <p:cTn id="101" dur="1" fill="hold">
+                                          <p:stCondLst>
+                                            <p:cond delay="0"/>
+                                          </p:stCondLst>
+                                        </p:cTn>
+                                        <p:tgtEl>
+                                          <p:spTgt spid="92"/>
+                                        </p:tgtEl>
+                                        <p:attrNameLst>
+                                          <p:attrName>style.visibility</p:attrName>
+                                        </p:attrNameLst>
+                                      </p:cBhvr>
+                                      <p:to>
+                                        <p:strVal val="visible"/>
+                                      </p:to>
+                                    </p:set>
+                                    <p:animEffect transition="in" filter="wipe(down)">
+                                      <p:cBhvr>
                                         <p:cTn id="102" dur="500"/>
                                         <p:tgtEl>
-                                          <p:spTgt spid="13"/>
+                                          <p:spTgt spid="92"/>
                                         </p:tgtEl>
                                       </p:cBhvr>
                                     </p:animEffect>
@@ -6145,7 +6454,7 @@
                                           </p:stCondLst>
                                         </p:cTn>
                                         <p:tgtEl>
-                                          <p:spTgt spid="12"/>
+                                          <p:spTgt spid="93"/>
                                         </p:tgtEl>
                                         <p:attrNameLst>
                                           <p:attrName>style.visibility</p:attrName>
@@ -6159,7 +6468,7 @@
                                       <p:cBhvr>
                                         <p:cTn id="105" dur="500"/>
                                         <p:tgtEl>
-                                          <p:spTgt spid="12"/>
+                                          <p:spTgt spid="93"/>
                                         </p:tgtEl>
                                       </p:cBhvr>
                                     </p:animEffect>
@@ -6180,7 +6489,7 @@
                                           </p:stCondLst>
                                         </p:cTn>
                                         <p:tgtEl>
-                                          <p:spTgt spid="20"/>
+                                          <p:spTgt spid="97"/>
                                         </p:tgtEl>
                                         <p:attrNameLst>
                                           <p:attrName>style.visibility</p:attrName>
@@ -6194,7 +6503,7 @@
                                       <p:cBhvr>
                                         <p:cTn id="108" dur="500"/>
                                         <p:tgtEl>
-                                          <p:spTgt spid="20"/>
+                                          <p:spTgt spid="97"/>
                                         </p:tgtEl>
                                       </p:cBhvr>
                                     </p:animEffect>
@@ -6543,4 +6852,10 @@
     </a:ext>
   </a:extLst>
 </a:theme>
+</file>
+
+<file path=docMetadata/LabelInfo.xml><?xml version="1.0" encoding="utf-8"?>
+<clbl:labelList xmlns:clbl="http://schemas.microsoft.com/office/2020/mipLabelMetadata">
+  <clbl:label id="{1a407a2d-7675-4d17-8692-b3ac285306e4}" enabled="0" method="" siteId="{1a407a2d-7675-4d17-8692-b3ac285306e4}" removed="1"/>
+</clbl:labelList>
 </file>
</xml_diff>

<commit_message>
285 update profiles graphic with hl7 ihe (#490)
* Cover page updates(release version and publication date)

* had forgotten to add the new svg file
</commit_message>
<xml_diff>
--- a/sources/vol1-diagram-sdpi-profiles.pptx
+++ b/sources/vol1-diagram-sdpi-profiles.pptx
@@ -112,6 +112,291 @@
 </p:presentation>
 </file>
 
+<file path=ppt/changesInfos/changesInfo1.xml><?xml version="1.0" encoding="utf-8"?>
+<pc:chgInfo xmlns:a="http://schemas.openxmlformats.org/drawingml/2006/main" xmlns:r="http://schemas.openxmlformats.org/officeDocument/2006/relationships" xmlns:ac="http://schemas.microsoft.com/office/drawing/2013/main/command" xmlns:pc="http://schemas.microsoft.com/office/powerpoint/2013/main/command">
+  <pc:docChgLst>
+    <pc:chgData name="Espina Perez, Javier" userId="21026bb2-5a6b-4dc0-9f38-b05e8fbcde9c" providerId="ADAL" clId="{8DADF8CC-3600-416D-A641-D1A778A57480}"/>
+    <pc:docChg chg="undo custSel modSld">
+      <pc:chgData name="Espina Perez, Javier" userId="21026bb2-5a6b-4dc0-9f38-b05e8fbcde9c" providerId="ADAL" clId="{8DADF8CC-3600-416D-A641-D1A778A57480}" dt="2025-11-07T14:55:04.268" v="345" actId="14100"/>
+      <pc:docMkLst>
+        <pc:docMk/>
+      </pc:docMkLst>
+      <pc:sldChg chg="addSp delSp modSp mod addAnim delAnim modAnim">
+        <pc:chgData name="Espina Perez, Javier" userId="21026bb2-5a6b-4dc0-9f38-b05e8fbcde9c" providerId="ADAL" clId="{8DADF8CC-3600-416D-A641-D1A778A57480}" dt="2025-11-07T14:55:04.268" v="345" actId="14100"/>
+        <pc:sldMkLst>
+          <pc:docMk/>
+          <pc:sldMk cId="850373823" sldId="289"/>
+        </pc:sldMkLst>
+        <pc:spChg chg="add del mod">
+          <ac:chgData name="Espina Perez, Javier" userId="21026bb2-5a6b-4dc0-9f38-b05e8fbcde9c" providerId="ADAL" clId="{8DADF8CC-3600-416D-A641-D1A778A57480}" dt="2025-11-07T14:47:02.575" v="336" actId="478"/>
+          <ac:spMkLst>
+            <pc:docMk/>
+            <pc:sldMk cId="850373823" sldId="289"/>
+            <ac:spMk id="2" creationId="{F4CA7617-7799-A596-C699-CDE9866C2ABA}"/>
+          </ac:spMkLst>
+        </pc:spChg>
+        <pc:spChg chg="add del mod">
+          <ac:chgData name="Espina Perez, Javier" userId="21026bb2-5a6b-4dc0-9f38-b05e8fbcde9c" providerId="ADAL" clId="{8DADF8CC-3600-416D-A641-D1A778A57480}" dt="2025-11-07T14:38:34.519" v="315" actId="2085"/>
+          <ac:spMkLst>
+            <pc:docMk/>
+            <pc:sldMk cId="850373823" sldId="289"/>
+            <ac:spMk id="3" creationId="{65FF9B69-A599-4EDE-394E-50092FE13630}"/>
+          </ac:spMkLst>
+        </pc:spChg>
+        <pc:spChg chg="mod">
+          <ac:chgData name="Espina Perez, Javier" userId="21026bb2-5a6b-4dc0-9f38-b05e8fbcde9c" providerId="ADAL" clId="{8DADF8CC-3600-416D-A641-D1A778A57480}" dt="2025-10-17T09:58:16.439" v="18" actId="20577"/>
+          <ac:spMkLst>
+            <pc:docMk/>
+            <pc:sldMk cId="850373823" sldId="289"/>
+            <ac:spMk id="6" creationId="{589A218D-E265-FA36-091B-8B6E7AE6A674}"/>
+          </ac:spMkLst>
+        </pc:spChg>
+        <pc:spChg chg="mod">
+          <ac:chgData name="Espina Perez, Javier" userId="21026bb2-5a6b-4dc0-9f38-b05e8fbcde9c" providerId="ADAL" clId="{8DADF8CC-3600-416D-A641-D1A778A57480}" dt="2025-10-17T09:58:19.133" v="19" actId="20577"/>
+          <ac:spMkLst>
+            <pc:docMk/>
+            <pc:sldMk cId="850373823" sldId="289"/>
+            <ac:spMk id="7" creationId="{75F3BD69-2340-1867-1DD3-2EE46B319E00}"/>
+          </ac:spMkLst>
+        </pc:spChg>
+        <pc:spChg chg="mod">
+          <ac:chgData name="Espina Perez, Javier" userId="21026bb2-5a6b-4dc0-9f38-b05e8fbcde9c" providerId="ADAL" clId="{8DADF8CC-3600-416D-A641-D1A778A57480}" dt="2025-11-07T14:40:47.197" v="325" actId="692"/>
+          <ac:spMkLst>
+            <pc:docMk/>
+            <pc:sldMk cId="850373823" sldId="289"/>
+            <ac:spMk id="8" creationId="{D6E45C1F-6931-7EDD-E880-BBC91A5EAAFE}"/>
+          </ac:spMkLst>
+        </pc:spChg>
+        <pc:spChg chg="mod">
+          <ac:chgData name="Espina Perez, Javier" userId="21026bb2-5a6b-4dc0-9f38-b05e8fbcde9c" providerId="ADAL" clId="{8DADF8CC-3600-416D-A641-D1A778A57480}" dt="2025-11-07T14:39:44.065" v="322" actId="207"/>
+          <ac:spMkLst>
+            <pc:docMk/>
+            <pc:sldMk cId="850373823" sldId="289"/>
+            <ac:spMk id="13" creationId="{2CFBCCB6-EB8A-7A54-7816-9282970ADACE}"/>
+          </ac:spMkLst>
+        </pc:spChg>
+        <pc:spChg chg="mod">
+          <ac:chgData name="Espina Perez, Javier" userId="21026bb2-5a6b-4dc0-9f38-b05e8fbcde9c" providerId="ADAL" clId="{8DADF8CC-3600-416D-A641-D1A778A57480}" dt="2025-11-05T10:02:39.342" v="176" actId="1037"/>
+          <ac:spMkLst>
+            <pc:docMk/>
+            <pc:sldMk cId="850373823" sldId="289"/>
+            <ac:spMk id="14" creationId="{57C8BA0E-C07C-7998-38A2-106DB39377B4}"/>
+          </ac:spMkLst>
+        </pc:spChg>
+        <pc:spChg chg="mod">
+          <ac:chgData name="Espina Perez, Javier" userId="21026bb2-5a6b-4dc0-9f38-b05e8fbcde9c" providerId="ADAL" clId="{8DADF8CC-3600-416D-A641-D1A778A57480}" dt="2025-11-05T10:06:12.106" v="206" actId="20577"/>
+          <ac:spMkLst>
+            <pc:docMk/>
+            <pc:sldMk cId="850373823" sldId="289"/>
+            <ac:spMk id="15" creationId="{DAD2915A-3EBD-C8E5-1290-79CDF03B1063}"/>
+          </ac:spMkLst>
+        </pc:spChg>
+        <pc:spChg chg="mod">
+          <ac:chgData name="Espina Perez, Javier" userId="21026bb2-5a6b-4dc0-9f38-b05e8fbcde9c" providerId="ADAL" clId="{8DADF8CC-3600-416D-A641-D1A778A57480}" dt="2025-11-07T14:54:57.318" v="343" actId="14100"/>
+          <ac:spMkLst>
+            <pc:docMk/>
+            <pc:sldMk cId="850373823" sldId="289"/>
+            <ac:spMk id="16" creationId="{5D8CCF33-0398-C57B-EBA3-5C8C225DD4CA}"/>
+          </ac:spMkLst>
+        </pc:spChg>
+        <pc:spChg chg="mod">
+          <ac:chgData name="Espina Perez, Javier" userId="21026bb2-5a6b-4dc0-9f38-b05e8fbcde9c" providerId="ADAL" clId="{8DADF8CC-3600-416D-A641-D1A778A57480}" dt="2025-11-07T14:55:00.953" v="344" actId="14100"/>
+          <ac:spMkLst>
+            <pc:docMk/>
+            <pc:sldMk cId="850373823" sldId="289"/>
+            <ac:spMk id="17" creationId="{FDEA11C8-2DB0-3AB0-9E6F-553C3C1F5577}"/>
+          </ac:spMkLst>
+        </pc:spChg>
+        <pc:spChg chg="mod">
+          <ac:chgData name="Espina Perez, Javier" userId="21026bb2-5a6b-4dc0-9f38-b05e8fbcde9c" providerId="ADAL" clId="{8DADF8CC-3600-416D-A641-D1A778A57480}" dt="2025-11-05T10:02:39.342" v="176" actId="1037"/>
+          <ac:spMkLst>
+            <pc:docMk/>
+            <pc:sldMk cId="850373823" sldId="289"/>
+            <ac:spMk id="18" creationId="{CF8EAEFF-6A61-520A-5517-72C032F92E4D}"/>
+          </ac:spMkLst>
+        </pc:spChg>
+        <pc:spChg chg="mod">
+          <ac:chgData name="Espina Perez, Javier" userId="21026bb2-5a6b-4dc0-9f38-b05e8fbcde9c" providerId="ADAL" clId="{8DADF8CC-3600-416D-A641-D1A778A57480}" dt="2025-11-05T10:02:39.342" v="176" actId="1037"/>
+          <ac:spMkLst>
+            <pc:docMk/>
+            <pc:sldMk cId="850373823" sldId="289"/>
+            <ac:spMk id="19" creationId="{6AAD8503-1255-648D-D1EF-1B2C37B6B855}"/>
+          </ac:spMkLst>
+        </pc:spChg>
+        <pc:spChg chg="mod">
+          <ac:chgData name="Espina Perez, Javier" userId="21026bb2-5a6b-4dc0-9f38-b05e8fbcde9c" providerId="ADAL" clId="{8DADF8CC-3600-416D-A641-D1A778A57480}" dt="2025-11-05T10:02:39.342" v="176" actId="1037"/>
+          <ac:spMkLst>
+            <pc:docMk/>
+            <pc:sldMk cId="850373823" sldId="289"/>
+            <ac:spMk id="25" creationId="{7C826CE6-E53A-1373-A9F0-DA4EA1BF6A39}"/>
+          </ac:spMkLst>
+        </pc:spChg>
+        <pc:spChg chg="mod">
+          <ac:chgData name="Espina Perez, Javier" userId="21026bb2-5a6b-4dc0-9f38-b05e8fbcde9c" providerId="ADAL" clId="{8DADF8CC-3600-416D-A641-D1A778A57480}" dt="2025-11-05T10:25:12.766" v="307" actId="14100"/>
+          <ac:spMkLst>
+            <pc:docMk/>
+            <pc:sldMk cId="850373823" sldId="289"/>
+            <ac:spMk id="32" creationId="{2B2E7B30-D35D-A3FD-AF20-E9088E9CF3B0}"/>
+          </ac:spMkLst>
+        </pc:spChg>
+        <pc:spChg chg="mod">
+          <ac:chgData name="Espina Perez, Javier" userId="21026bb2-5a6b-4dc0-9f38-b05e8fbcde9c" providerId="ADAL" clId="{8DADF8CC-3600-416D-A641-D1A778A57480}" dt="2025-11-05T10:24:36.787" v="304" actId="1076"/>
+          <ac:spMkLst>
+            <pc:docMk/>
+            <pc:sldMk cId="850373823" sldId="289"/>
+            <ac:spMk id="33" creationId="{96729C0E-9B14-9C5D-8B76-4E0B7B7ED0F6}"/>
+          </ac:spMkLst>
+        </pc:spChg>
+        <pc:spChg chg="add del mod">
+          <ac:chgData name="Espina Perez, Javier" userId="21026bb2-5a6b-4dc0-9f38-b05e8fbcde9c" providerId="ADAL" clId="{8DADF8CC-3600-416D-A641-D1A778A57480}" dt="2025-11-07T14:37:57.338" v="312" actId="478"/>
+          <ac:spMkLst>
+            <pc:docMk/>
+            <pc:sldMk cId="850373823" sldId="289"/>
+            <ac:spMk id="71" creationId="{220928F7-E48A-3FF9-566B-62C125A94255}"/>
+          </ac:spMkLst>
+        </pc:spChg>
+        <pc:cxnChg chg="mod">
+          <ac:chgData name="Espina Perez, Javier" userId="21026bb2-5a6b-4dc0-9f38-b05e8fbcde9c" providerId="ADAL" clId="{8DADF8CC-3600-416D-A641-D1A778A57480}" dt="2025-11-05T10:00:53.914" v="85" actId="692"/>
+          <ac:cxnSpMkLst>
+            <pc:docMk/>
+            <pc:sldMk cId="850373823" sldId="289"/>
+            <ac:cxnSpMk id="9" creationId="{6DD09084-8F6E-760C-48A6-734118E18E80}"/>
+          </ac:cxnSpMkLst>
+        </pc:cxnChg>
+        <pc:cxnChg chg="mod">
+          <ac:chgData name="Espina Perez, Javier" userId="21026bb2-5a6b-4dc0-9f38-b05e8fbcde9c" providerId="ADAL" clId="{8DADF8CC-3600-416D-A641-D1A778A57480}" dt="2025-11-05T10:00:53.914" v="85" actId="692"/>
+          <ac:cxnSpMkLst>
+            <pc:docMk/>
+            <pc:sldMk cId="850373823" sldId="289"/>
+            <ac:cxnSpMk id="10" creationId="{D963D5E3-F75B-2F5A-F341-E8E85B7E22BF}"/>
+          </ac:cxnSpMkLst>
+        </pc:cxnChg>
+        <pc:cxnChg chg="mod">
+          <ac:chgData name="Espina Perez, Javier" userId="21026bb2-5a6b-4dc0-9f38-b05e8fbcde9c" providerId="ADAL" clId="{8DADF8CC-3600-416D-A641-D1A778A57480}" dt="2025-11-05T10:00:53.914" v="85" actId="692"/>
+          <ac:cxnSpMkLst>
+            <pc:docMk/>
+            <pc:sldMk cId="850373823" sldId="289"/>
+            <ac:cxnSpMk id="11" creationId="{2AD97EC3-63D1-8EA0-5C50-4CE57F2EAD70}"/>
+          </ac:cxnSpMkLst>
+        </pc:cxnChg>
+        <pc:cxnChg chg="mod">
+          <ac:chgData name="Espina Perez, Javier" userId="21026bb2-5a6b-4dc0-9f38-b05e8fbcde9c" providerId="ADAL" clId="{8DADF8CC-3600-416D-A641-D1A778A57480}" dt="2025-11-07T14:55:00.953" v="344" actId="14100"/>
+          <ac:cxnSpMkLst>
+            <pc:docMk/>
+            <pc:sldMk cId="850373823" sldId="289"/>
+            <ac:cxnSpMk id="22" creationId="{F06B9044-C732-3AA3-044F-1BC0B3672C33}"/>
+          </ac:cxnSpMkLst>
+        </pc:cxnChg>
+        <pc:cxnChg chg="mod">
+          <ac:chgData name="Espina Perez, Javier" userId="21026bb2-5a6b-4dc0-9f38-b05e8fbcde9c" providerId="ADAL" clId="{8DADF8CC-3600-416D-A641-D1A778A57480}" dt="2025-11-05T10:03:03.320" v="178" actId="14100"/>
+          <ac:cxnSpMkLst>
+            <pc:docMk/>
+            <pc:sldMk cId="850373823" sldId="289"/>
+            <ac:cxnSpMk id="23" creationId="{DB943C77-21AE-FD4C-807B-91D7343875B4}"/>
+          </ac:cxnSpMkLst>
+        </pc:cxnChg>
+        <pc:cxnChg chg="mod">
+          <ac:chgData name="Espina Perez, Javier" userId="21026bb2-5a6b-4dc0-9f38-b05e8fbcde9c" providerId="ADAL" clId="{8DADF8CC-3600-416D-A641-D1A778A57480}" dt="2025-11-05T10:03:16.609" v="181" actId="14100"/>
+          <ac:cxnSpMkLst>
+            <pc:docMk/>
+            <pc:sldMk cId="850373823" sldId="289"/>
+            <ac:cxnSpMk id="24" creationId="{2490466B-41DA-A24A-EA20-C0F5EE9396D0}"/>
+          </ac:cxnSpMkLst>
+        </pc:cxnChg>
+        <pc:cxnChg chg="mod">
+          <ac:chgData name="Espina Perez, Javier" userId="21026bb2-5a6b-4dc0-9f38-b05e8fbcde9c" providerId="ADAL" clId="{8DADF8CC-3600-416D-A641-D1A778A57480}" dt="2025-11-05T10:03:11.016" v="180" actId="14100"/>
+          <ac:cxnSpMkLst>
+            <pc:docMk/>
+            <pc:sldMk cId="850373823" sldId="289"/>
+            <ac:cxnSpMk id="26" creationId="{408E61C7-82E2-41EE-230A-A0C2E1C99C9F}"/>
+          </ac:cxnSpMkLst>
+        </pc:cxnChg>
+        <pc:cxnChg chg="mod">
+          <ac:chgData name="Espina Perez, Javier" userId="21026bb2-5a6b-4dc0-9f38-b05e8fbcde9c" providerId="ADAL" clId="{8DADF8CC-3600-416D-A641-D1A778A57480}" dt="2025-11-05T10:02:39.342" v="176" actId="1037"/>
+          <ac:cxnSpMkLst>
+            <pc:docMk/>
+            <pc:sldMk cId="850373823" sldId="289"/>
+            <ac:cxnSpMk id="27" creationId="{7D1F85A8-4CA6-E6B3-AE41-5402D7B38B87}"/>
+          </ac:cxnSpMkLst>
+        </pc:cxnChg>
+        <pc:cxnChg chg="mod">
+          <ac:chgData name="Espina Perez, Javier" userId="21026bb2-5a6b-4dc0-9f38-b05e8fbcde9c" providerId="ADAL" clId="{8DADF8CC-3600-416D-A641-D1A778A57480}" dt="2025-11-05T10:01:26.849" v="91" actId="692"/>
+          <ac:cxnSpMkLst>
+            <pc:docMk/>
+            <pc:sldMk cId="850373823" sldId="289"/>
+            <ac:cxnSpMk id="28" creationId="{CA8A985F-211A-2C31-1260-C6CA742A0307}"/>
+          </ac:cxnSpMkLst>
+        </pc:cxnChg>
+        <pc:cxnChg chg="mod">
+          <ac:chgData name="Espina Perez, Javier" userId="21026bb2-5a6b-4dc0-9f38-b05e8fbcde9c" providerId="ADAL" clId="{8DADF8CC-3600-416D-A641-D1A778A57480}" dt="2025-11-05T10:02:39.342" v="176" actId="1037"/>
+          <ac:cxnSpMkLst>
+            <pc:docMk/>
+            <pc:sldMk cId="850373823" sldId="289"/>
+            <ac:cxnSpMk id="29" creationId="{4FCD3117-A172-8146-3101-9B9069ED50A4}"/>
+          </ac:cxnSpMkLst>
+        </pc:cxnChg>
+        <pc:cxnChg chg="mod">
+          <ac:chgData name="Espina Perez, Javier" userId="21026bb2-5a6b-4dc0-9f38-b05e8fbcde9c" providerId="ADAL" clId="{8DADF8CC-3600-416D-A641-D1A778A57480}" dt="2025-11-07T14:55:04.268" v="345" actId="14100"/>
+          <ac:cxnSpMkLst>
+            <pc:docMk/>
+            <pc:sldMk cId="850373823" sldId="289"/>
+            <ac:cxnSpMk id="30" creationId="{785D081C-1C43-3A8E-ACEF-80A2327AB25C}"/>
+          </ac:cxnSpMkLst>
+        </pc:cxnChg>
+        <pc:cxnChg chg="mod">
+          <ac:chgData name="Espina Perez, Javier" userId="21026bb2-5a6b-4dc0-9f38-b05e8fbcde9c" providerId="ADAL" clId="{8DADF8CC-3600-416D-A641-D1A778A57480}" dt="2025-11-05T10:02:53.940" v="177" actId="14100"/>
+          <ac:cxnSpMkLst>
+            <pc:docMk/>
+            <pc:sldMk cId="850373823" sldId="289"/>
+            <ac:cxnSpMk id="31" creationId="{92DD48AB-A1DC-6A15-45C0-5723389F3B21}"/>
+          </ac:cxnSpMkLst>
+        </pc:cxnChg>
+        <pc:cxnChg chg="mod">
+          <ac:chgData name="Espina Perez, Javier" userId="21026bb2-5a6b-4dc0-9f38-b05e8fbcde9c" providerId="ADAL" clId="{8DADF8CC-3600-416D-A641-D1A778A57480}" dt="2025-11-05T10:25:12.766" v="307" actId="14100"/>
+          <ac:cxnSpMkLst>
+            <pc:docMk/>
+            <pc:sldMk cId="850373823" sldId="289"/>
+            <ac:cxnSpMk id="34" creationId="{627435D3-34D6-DEFC-E4FE-68DDD284F76F}"/>
+          </ac:cxnSpMkLst>
+        </pc:cxnChg>
+        <pc:cxnChg chg="add del mod">
+          <ac:chgData name="Espina Perez, Javier" userId="21026bb2-5a6b-4dc0-9f38-b05e8fbcde9c" providerId="ADAL" clId="{8DADF8CC-3600-416D-A641-D1A778A57480}" dt="2025-11-07T14:44:40.811" v="328" actId="478"/>
+          <ac:cxnSpMkLst>
+            <pc:docMk/>
+            <pc:sldMk cId="850373823" sldId="289"/>
+            <ac:cxnSpMk id="77" creationId="{723BD866-9C63-1866-B422-4AC2738388F0}"/>
+          </ac:cxnSpMkLst>
+        </pc:cxnChg>
+        <pc:cxnChg chg="add mod">
+          <ac:chgData name="Espina Perez, Javier" userId="21026bb2-5a6b-4dc0-9f38-b05e8fbcde9c" providerId="ADAL" clId="{8DADF8CC-3600-416D-A641-D1A778A57480}" dt="2025-11-07T14:54:33.240" v="341" actId="14100"/>
+          <ac:cxnSpMkLst>
+            <pc:docMk/>
+            <pc:sldMk cId="850373823" sldId="289"/>
+            <ac:cxnSpMk id="92" creationId="{5CEB89E3-06D7-CEA5-34A0-D038C8EE2F25}"/>
+          </ac:cxnSpMkLst>
+        </pc:cxnChg>
+        <pc:cxnChg chg="add mod">
+          <ac:chgData name="Espina Perez, Javier" userId="21026bb2-5a6b-4dc0-9f38-b05e8fbcde9c" providerId="ADAL" clId="{8DADF8CC-3600-416D-A641-D1A778A57480}" dt="2025-11-07T14:54:42.838" v="342" actId="14100"/>
+          <ac:cxnSpMkLst>
+            <pc:docMk/>
+            <pc:sldMk cId="850373823" sldId="289"/>
+            <ac:cxnSpMk id="93" creationId="{AC5C2B61-46C3-C616-BCA7-B9A10B5F09BB}"/>
+          </ac:cxnSpMkLst>
+        </pc:cxnChg>
+        <pc:cxnChg chg="add mod">
+          <ac:chgData name="Espina Perez, Javier" userId="21026bb2-5a6b-4dc0-9f38-b05e8fbcde9c" providerId="ADAL" clId="{8DADF8CC-3600-416D-A641-D1A778A57480}" dt="2025-11-07T14:41:19.053" v="326" actId="208"/>
+          <ac:cxnSpMkLst>
+            <pc:docMk/>
+            <pc:sldMk cId="850373823" sldId="289"/>
+            <ac:cxnSpMk id="97" creationId="{EC904554-3D84-10F8-CA85-74E78FE4AF50}"/>
+          </ac:cxnSpMkLst>
+        </pc:cxnChg>
+      </pc:sldChg>
+    </pc:docChg>
+  </pc:docChgLst>
+</pc:chgInfo>
+</file>
+
 <file path=ppt/slideLayouts/slideLayout1.xml><?xml version="1.0" encoding="utf-8"?>
 <p:sldLayout xmlns:a="http://schemas.openxmlformats.org/drawingml/2006/main" xmlns:r="http://schemas.openxmlformats.org/officeDocument/2006/relationships" xmlns:p="http://schemas.openxmlformats.org/presentationml/2006/main" type="title" preserve="1">
   <p:cSld name="Title Slide">
@@ -259,7 +544,7 @@
           <a:p>
             <a:fld id="{CEAB79FE-F2B8-4F38-B4B7-E17A89FC2611}" type="datetimeFigureOut">
               <a:rPr lang="en-US" smtClean="0"/>
-              <a:t>1/27/2023</a:t>
+              <a:t>11/7/2025</a:t>
             </a:fld>
             <a:endParaRPr lang="en-US"/>
           </a:p>
@@ -457,7 +742,7 @@
           <a:p>
             <a:fld id="{CEAB79FE-F2B8-4F38-B4B7-E17A89FC2611}" type="datetimeFigureOut">
               <a:rPr lang="en-US" smtClean="0"/>
-              <a:t>1/27/2023</a:t>
+              <a:t>11/7/2025</a:t>
             </a:fld>
             <a:endParaRPr lang="en-US"/>
           </a:p>
@@ -665,7 +950,7 @@
           <a:p>
             <a:fld id="{CEAB79FE-F2B8-4F38-B4B7-E17A89FC2611}" type="datetimeFigureOut">
               <a:rPr lang="en-US" smtClean="0"/>
-              <a:t>1/27/2023</a:t>
+              <a:t>11/7/2025</a:t>
             </a:fld>
             <a:endParaRPr lang="en-US"/>
           </a:p>
@@ -863,7 +1148,7 @@
           <a:p>
             <a:fld id="{CEAB79FE-F2B8-4F38-B4B7-E17A89FC2611}" type="datetimeFigureOut">
               <a:rPr lang="en-US" smtClean="0"/>
-              <a:t>1/27/2023</a:t>
+              <a:t>11/7/2025</a:t>
             </a:fld>
             <a:endParaRPr lang="en-US"/>
           </a:p>
@@ -1138,7 +1423,7 @@
           <a:p>
             <a:fld id="{CEAB79FE-F2B8-4F38-B4B7-E17A89FC2611}" type="datetimeFigureOut">
               <a:rPr lang="en-US" smtClean="0"/>
-              <a:t>1/27/2023</a:t>
+              <a:t>11/7/2025</a:t>
             </a:fld>
             <a:endParaRPr lang="en-US"/>
           </a:p>
@@ -1403,7 +1688,7 @@
           <a:p>
             <a:fld id="{CEAB79FE-F2B8-4F38-B4B7-E17A89FC2611}" type="datetimeFigureOut">
               <a:rPr lang="en-US" smtClean="0"/>
-              <a:t>1/27/2023</a:t>
+              <a:t>11/7/2025</a:t>
             </a:fld>
             <a:endParaRPr lang="en-US"/>
           </a:p>
@@ -1815,7 +2100,7 @@
           <a:p>
             <a:fld id="{CEAB79FE-F2B8-4F38-B4B7-E17A89FC2611}" type="datetimeFigureOut">
               <a:rPr lang="en-US" smtClean="0"/>
-              <a:t>1/27/2023</a:t>
+              <a:t>11/7/2025</a:t>
             </a:fld>
             <a:endParaRPr lang="en-US"/>
           </a:p>
@@ -1956,7 +2241,7 @@
           <a:p>
             <a:fld id="{CEAB79FE-F2B8-4F38-B4B7-E17A89FC2611}" type="datetimeFigureOut">
               <a:rPr lang="en-US" smtClean="0"/>
-              <a:t>1/27/2023</a:t>
+              <a:t>11/7/2025</a:t>
             </a:fld>
             <a:endParaRPr lang="en-US"/>
           </a:p>
@@ -2069,7 +2354,7 @@
           <a:p>
             <a:fld id="{CEAB79FE-F2B8-4F38-B4B7-E17A89FC2611}" type="datetimeFigureOut">
               <a:rPr lang="en-US" smtClean="0"/>
-              <a:t>1/27/2023</a:t>
+              <a:t>11/7/2025</a:t>
             </a:fld>
             <a:endParaRPr lang="en-US"/>
           </a:p>
@@ -2380,7 +2665,7 @@
           <a:p>
             <a:fld id="{CEAB79FE-F2B8-4F38-B4B7-E17A89FC2611}" type="datetimeFigureOut">
               <a:rPr lang="en-US" smtClean="0"/>
-              <a:t>1/27/2023</a:t>
+              <a:t>11/7/2025</a:t>
             </a:fld>
             <a:endParaRPr lang="en-US"/>
           </a:p>
@@ -2668,7 +2953,7 @@
           <a:p>
             <a:fld id="{CEAB79FE-F2B8-4F38-B4B7-E17A89FC2611}" type="datetimeFigureOut">
               <a:rPr lang="en-US" smtClean="0"/>
-              <a:t>1/27/2023</a:t>
+              <a:t>11/7/2025</a:t>
             </a:fld>
             <a:endParaRPr lang="en-US"/>
           </a:p>
@@ -2909,7 +3194,7 @@
           <a:p>
             <a:fld id="{CEAB79FE-F2B8-4F38-B4B7-E17A89FC2611}" type="datetimeFigureOut">
               <a:rPr lang="en-US" smtClean="0"/>
-              <a:t>1/27/2023</a:t>
+              <a:t>11/7/2025</a:t>
             </a:fld>
             <a:endParaRPr lang="en-US"/>
           </a:p>
@@ -3349,7 +3634,7 @@
           <a:solidFill>
             <a:srgbClr val="064578"/>
           </a:solidFill>
-          <a:ln>
+          <a:ln w="31750">
             <a:noFill/>
           </a:ln>
         </p:spPr>
@@ -3380,7 +3665,7 @@
                   <a:schemeClr val="bg1"/>
                 </a:solidFill>
               </a:rPr>
-              <a:t>IHE SDPi Profiles for “PRACtical” Device Interoperability</a:t>
+              <a:t>HL7-IHE SDPi Profiles for “PRACtical” Device Interoperability</a:t>
             </a:r>
           </a:p>
         </p:txBody>
@@ -3576,8 +3861,12 @@
           <a:p>
             <a:pPr algn="ctr"/>
             <a:r>
+              <a:rPr lang="en-US" dirty="0" err="1"/>
+              <a:t>SDPi</a:t>
+            </a:r>
+            <a:r>
               <a:rPr lang="en-US" dirty="0"/>
-              <a:t>SDPi  Reporting</a:t>
+              <a:t> Reporting</a:t>
             </a:r>
           </a:p>
           <a:p>
@@ -3640,8 +3929,12 @@
           <a:p>
             <a:pPr algn="ctr"/>
             <a:r>
+              <a:rPr lang="en-US" dirty="0" err="1"/>
+              <a:t>SDPi</a:t>
+            </a:r>
+            <a:r>
               <a:rPr lang="en-US" dirty="0"/>
-              <a:t>SDPi  Alerting</a:t>
+              <a:t> Alerting</a:t>
             </a:r>
           </a:p>
           <a:p>
@@ -3674,9 +3967,9 @@
             <a:avLst/>
           </a:prstGeom>
           <a:noFill/>
-          <a:ln>
+          <a:ln w="19050">
             <a:solidFill>
-              <a:schemeClr val="bg1"/>
+              <a:srgbClr val="92D050"/>
             </a:solidFill>
             <a:prstDash val="dash"/>
           </a:ln>
@@ -3729,7 +4022,7 @@
           <a:prstGeom prst="straightConnector1">
             <a:avLst/>
           </a:prstGeom>
-          <a:ln w="19050">
+          <a:ln w="31750">
             <a:solidFill>
               <a:schemeClr val="bg1"/>
             </a:solidFill>
@@ -3776,7 +4069,7 @@
           <a:prstGeom prst="straightConnector1">
             <a:avLst/>
           </a:prstGeom>
-          <a:ln w="19050">
+          <a:ln w="31750">
             <a:solidFill>
               <a:schemeClr val="bg1"/>
             </a:solidFill>
@@ -3822,7 +4115,7 @@
           <a:prstGeom prst="straightConnector1">
             <a:avLst/>
           </a:prstGeom>
-          <a:ln w="19050">
+          <a:ln w="31750">
             <a:solidFill>
               <a:schemeClr val="bg1"/>
             </a:solidFill>
@@ -3845,50 +4138,6 @@
           </a:fontRef>
         </p:style>
       </p:cxnSp>
-      <p:cxnSp>
-        <p:nvCxnSpPr>
-          <p:cNvPr id="12" name="Straight Arrow Connector 11">
-            <a:extLst>
-              <a:ext uri="{FF2B5EF4-FFF2-40B4-BE49-F238E27FC236}">
-                <a16:creationId xmlns:a16="http://schemas.microsoft.com/office/drawing/2014/main" id="{5CEB89E3-06D7-CEA5-34A0-D038C8EE2F25}"/>
-              </a:ext>
-            </a:extLst>
-          </p:cNvPr>
-          <p:cNvCxnSpPr>
-            <a:cxnSpLocks/>
-          </p:cNvCxnSpPr>
-          <p:nvPr/>
-        </p:nvCxnSpPr>
-        <p:spPr>
-          <a:xfrm flipH="1" flipV="1">
-            <a:off x="9346020" y="4366668"/>
-            <a:ext cx="299484" cy="368706"/>
-          </a:xfrm>
-          <a:prstGeom prst="straightConnector1">
-            <a:avLst/>
-          </a:prstGeom>
-          <a:ln w="19050">
-            <a:solidFill>
-              <a:srgbClr val="FF0000"/>
-            </a:solidFill>
-            <a:tailEnd type="triangle"/>
-          </a:ln>
-        </p:spPr>
-        <p:style>
-          <a:lnRef idx="1">
-            <a:schemeClr val="accent1"/>
-          </a:lnRef>
-          <a:fillRef idx="0">
-            <a:schemeClr val="accent1"/>
-          </a:fillRef>
-          <a:effectRef idx="0">
-            <a:schemeClr val="accent1"/>
-          </a:effectRef>
-          <a:fontRef idx="minor">
-            <a:schemeClr val="tx1"/>
-          </a:fontRef>
-        </p:style>
-      </p:cxnSp>
       <p:sp>
         <p:nvSpPr>
           <p:cNvPr id="13" name="TextBox 12">
@@ -3903,8 +4152,8 @@
         </p:nvSpPr>
         <p:spPr>
           <a:xfrm>
-            <a:off x="9448673" y="4593790"/>
-            <a:ext cx="1869694" cy="923330"/>
+            <a:off x="9878264" y="4352842"/>
+            <a:ext cx="1647952" cy="923330"/>
           </a:xfrm>
           <a:prstGeom prst="rect">
             <a:avLst/>
@@ -3921,7 +4170,7 @@
             <a:r>
               <a:rPr lang="en-US" dirty="0">
                 <a:solidFill>
-                  <a:srgbClr val="1E22AA"/>
+                  <a:srgbClr val="76A32E"/>
                 </a:solidFill>
               </a:rPr>
               <a:t>“medical” interoperability purpose</a:t>
@@ -3943,7 +4192,7 @@
         </p:nvSpPr>
         <p:spPr>
           <a:xfrm>
-            <a:off x="3049443" y="4738152"/>
+            <a:off x="2573193" y="4738152"/>
             <a:ext cx="1722475" cy="725756"/>
           </a:xfrm>
           <a:prstGeom prst="rect">
@@ -4011,7 +4260,7 @@
         </p:nvSpPr>
         <p:spPr>
           <a:xfrm>
-            <a:off x="3048243" y="5685834"/>
+            <a:off x="2571993" y="5685834"/>
             <a:ext cx="1722475" cy="725756"/>
           </a:xfrm>
           <a:prstGeom prst="rect">
@@ -4049,7 +4298,14 @@
             <a:pPr algn="ctr"/>
             <a:r>
               <a:rPr lang="en-US" dirty="0"/>
-              <a:t>FHIR Base Resources</a:t>
+              <a:t>HL7 FHIR</a:t>
+            </a:r>
+          </a:p>
+          <a:p>
+            <a:pPr algn="ctr"/>
+            <a:r>
+              <a:rPr lang="en-US" dirty="0"/>
+              <a:t>Core Resources</a:t>
             </a:r>
           </a:p>
         </p:txBody>
@@ -4068,8 +4324,8 @@
         </p:nvSpPr>
         <p:spPr>
           <a:xfrm>
-            <a:off x="7423172" y="4735374"/>
-            <a:ext cx="1722475" cy="725756"/>
+            <a:off x="6959779" y="4738152"/>
+            <a:ext cx="2671546" cy="725756"/>
           </a:xfrm>
           <a:prstGeom prst="rect">
             <a:avLst/>
@@ -4078,9 +4334,8 @@
             <a:srgbClr val="76A32E"/>
           </a:solidFill>
           <a:ln>
-            <a:solidFill>
-              <a:schemeClr val="bg1"/>
-            </a:solidFill>
+            <a:noFill/>
+            <a:prstDash val="dash"/>
           </a:ln>
         </p:spPr>
         <p:style>
@@ -4106,7 +4361,14 @@
             <a:pPr algn="ctr"/>
             <a:r>
               <a:rPr lang="en-US" dirty="0"/>
-              <a:t>SDC PKP Standards</a:t>
+              <a:t>IEEE SDC</a:t>
+            </a:r>
+          </a:p>
+          <a:p>
+            <a:pPr algn="ctr"/>
+            <a:r>
+              <a:rPr lang="en-US" dirty="0"/>
+              <a:t>PKP Standards</a:t>
             </a:r>
           </a:p>
         </p:txBody>
@@ -4125,8 +4387,8 @@
         </p:nvSpPr>
         <p:spPr>
           <a:xfrm>
-            <a:off x="7423175" y="5691282"/>
-            <a:ext cx="1722475" cy="725756"/>
+            <a:off x="6948943" y="5691282"/>
+            <a:ext cx="2682382" cy="725756"/>
           </a:xfrm>
           <a:prstGeom prst="rect">
             <a:avLst/>
@@ -4163,7 +4425,14 @@
             <a:pPr algn="ctr"/>
             <a:r>
               <a:rPr lang="en-US" dirty="0"/>
-              <a:t>SDC Core Standards</a:t>
+              <a:t>IEEE SDC</a:t>
+            </a:r>
+          </a:p>
+          <a:p>
+            <a:pPr algn="ctr"/>
+            <a:r>
+              <a:rPr lang="en-US" dirty="0"/>
+              <a:t>Core Standards</a:t>
             </a:r>
           </a:p>
         </p:txBody>
@@ -4182,7 +4451,7 @@
         </p:nvSpPr>
         <p:spPr>
           <a:xfrm>
-            <a:off x="5234760" y="4738908"/>
+            <a:off x="4758510" y="4738908"/>
             <a:ext cx="782607" cy="725756"/>
           </a:xfrm>
           <a:prstGeom prst="rect">
@@ -4220,7 +4489,7 @@
             <a:pPr algn="ctr"/>
             <a:r>
               <a:rPr lang="en-US" dirty="0"/>
-              <a:t>DEC</a:t>
+              <a:t>IHE DEC</a:t>
             </a:r>
           </a:p>
         </p:txBody>
@@ -4239,7 +4508,7 @@
         </p:nvSpPr>
         <p:spPr>
           <a:xfrm>
-            <a:off x="5234761" y="5685834"/>
+            <a:off x="4758511" y="5685834"/>
             <a:ext cx="1722475" cy="725756"/>
           </a:xfrm>
           <a:prstGeom prst="rect">
@@ -4284,97 +4553,6 @@
       </p:sp>
       <p:cxnSp>
         <p:nvCxnSpPr>
-          <p:cNvPr id="20" name="Straight Arrow Connector 19">
-            <a:extLst>
-              <a:ext uri="{FF2B5EF4-FFF2-40B4-BE49-F238E27FC236}">
-                <a16:creationId xmlns:a16="http://schemas.microsoft.com/office/drawing/2014/main" id="{AC5C2B61-46C3-C616-BCA7-B9A10B5F09BB}"/>
-              </a:ext>
-            </a:extLst>
-          </p:cNvPr>
-          <p:cNvCxnSpPr>
-            <a:cxnSpLocks/>
-            <a:stCxn id="13" idx="1"/>
-            <a:endCxn id="16" idx="3"/>
-          </p:cNvCxnSpPr>
-          <p:nvPr/>
-        </p:nvCxnSpPr>
-        <p:spPr>
-          <a:xfrm flipH="1">
-            <a:off x="9145647" y="5055455"/>
-            <a:ext cx="303026" cy="42797"/>
-          </a:xfrm>
-          <a:prstGeom prst="straightConnector1">
-            <a:avLst/>
-          </a:prstGeom>
-          <a:ln w="19050">
-            <a:solidFill>
-              <a:srgbClr val="FF0000"/>
-            </a:solidFill>
-            <a:tailEnd type="triangle"/>
-          </a:ln>
-        </p:spPr>
-        <p:style>
-          <a:lnRef idx="1">
-            <a:schemeClr val="accent1"/>
-          </a:lnRef>
-          <a:fillRef idx="0">
-            <a:schemeClr val="accent1"/>
-          </a:fillRef>
-          <a:effectRef idx="0">
-            <a:schemeClr val="accent1"/>
-          </a:effectRef>
-          <a:fontRef idx="minor">
-            <a:schemeClr val="tx1"/>
-          </a:fontRef>
-        </p:style>
-      </p:cxnSp>
-      <p:cxnSp>
-        <p:nvCxnSpPr>
-          <p:cNvPr id="21" name="Straight Arrow Connector 20">
-            <a:extLst>
-              <a:ext uri="{FF2B5EF4-FFF2-40B4-BE49-F238E27FC236}">
-                <a16:creationId xmlns:a16="http://schemas.microsoft.com/office/drawing/2014/main" id="{723BD866-9C63-1866-B422-4AC2738388F0}"/>
-              </a:ext>
-            </a:extLst>
-          </p:cNvPr>
-          <p:cNvCxnSpPr>
-            <a:cxnSpLocks/>
-            <a:endCxn id="16" idx="0"/>
-          </p:cNvCxnSpPr>
-          <p:nvPr/>
-        </p:nvCxnSpPr>
-        <p:spPr>
-          <a:xfrm>
-            <a:off x="8284408" y="4425216"/>
-            <a:ext cx="2" cy="310158"/>
-          </a:xfrm>
-          <a:prstGeom prst="straightConnector1">
-            <a:avLst/>
-          </a:prstGeom>
-          <a:ln w="19050">
-            <a:solidFill>
-              <a:srgbClr val="FF0000"/>
-            </a:solidFill>
-            <a:tailEnd type="triangle"/>
-          </a:ln>
-        </p:spPr>
-        <p:style>
-          <a:lnRef idx="1">
-            <a:schemeClr val="accent1"/>
-          </a:lnRef>
-          <a:fillRef idx="0">
-            <a:schemeClr val="accent1"/>
-          </a:fillRef>
-          <a:effectRef idx="0">
-            <a:schemeClr val="accent1"/>
-          </a:effectRef>
-          <a:fontRef idx="minor">
-            <a:schemeClr val="tx1"/>
-          </a:fontRef>
-        </p:style>
-      </p:cxnSp>
-      <p:cxnSp>
-        <p:nvCxnSpPr>
           <p:cNvPr id="22" name="Straight Arrow Connector 21">
             <a:extLst>
               <a:ext uri="{FF2B5EF4-FFF2-40B4-BE49-F238E27FC236}">
@@ -4390,16 +4568,16 @@
           <p:nvPr/>
         </p:nvCxnSpPr>
         <p:spPr>
-          <a:xfrm>
-            <a:off x="8284410" y="5461130"/>
-            <a:ext cx="3" cy="230152"/>
+          <a:xfrm flipH="1">
+            <a:off x="8290134" y="5463908"/>
+            <a:ext cx="5418" cy="227374"/>
           </a:xfrm>
           <a:prstGeom prst="straightConnector1">
             <a:avLst/>
           </a:prstGeom>
-          <a:ln w="19050">
+          <a:ln w="31750">
             <a:solidFill>
-              <a:srgbClr val="FF0000"/>
+              <a:srgbClr val="064578"/>
             </a:solidFill>
             <a:tailEnd type="triangle"/>
           </a:ln>
@@ -4435,14 +4613,14 @@
           <p:nvPr/>
         </p:nvCxnSpPr>
         <p:spPr>
-          <a:xfrm flipH="1">
-            <a:off x="5626063" y="5464664"/>
-            <a:ext cx="1" cy="281482"/>
+          <a:xfrm>
+            <a:off x="5149814" y="5464664"/>
+            <a:ext cx="0" cy="234136"/>
           </a:xfrm>
           <a:prstGeom prst="straightConnector1">
             <a:avLst/>
           </a:prstGeom>
-          <a:ln w="19050">
+          <a:ln w="12700">
             <a:solidFill>
               <a:schemeClr val="tx1"/>
             </a:solidFill>
@@ -4475,19 +4653,20 @@
           </p:cNvPr>
           <p:cNvCxnSpPr>
             <a:cxnSpLocks/>
+            <a:stCxn id="14" idx="2"/>
             <a:endCxn id="15" idx="0"/>
           </p:cNvCxnSpPr>
           <p:nvPr/>
         </p:nvCxnSpPr>
         <p:spPr>
-          <a:xfrm>
-            <a:off x="3907586" y="5415347"/>
-            <a:ext cx="1895" cy="270487"/>
+          <a:xfrm flipH="1">
+            <a:off x="3433231" y="5463908"/>
+            <a:ext cx="1200" cy="221926"/>
           </a:xfrm>
           <a:prstGeom prst="straightConnector1">
             <a:avLst/>
           </a:prstGeom>
-          <a:ln w="19050">
+          <a:ln w="12700">
             <a:solidFill>
               <a:schemeClr val="tx1"/>
             </a:solidFill>
@@ -4523,7 +4702,7 @@
         </p:nvSpPr>
         <p:spPr>
           <a:xfrm>
-            <a:off x="6174624" y="4738908"/>
+            <a:off x="5698374" y="4738908"/>
             <a:ext cx="782609" cy="725756"/>
           </a:xfrm>
           <a:prstGeom prst="rect">
@@ -4561,7 +4740,7 @@
             <a:pPr algn="ctr"/>
             <a:r>
               <a:rPr lang="en-US" dirty="0"/>
-              <a:t>ACM</a:t>
+              <a:t>IHE ACM</a:t>
             </a:r>
           </a:p>
         </p:txBody>
@@ -4577,18 +4756,19 @@
           </p:cNvPr>
           <p:cNvCxnSpPr>
             <a:cxnSpLocks/>
+            <a:stCxn id="25" idx="2"/>
           </p:cNvCxnSpPr>
           <p:nvPr/>
         </p:nvCxnSpPr>
         <p:spPr>
-          <a:xfrm flipH="1">
-            <a:off x="6637457" y="5417318"/>
-            <a:ext cx="1" cy="281482"/>
+          <a:xfrm>
+            <a:off x="6089679" y="5464664"/>
+            <a:ext cx="8213" cy="234136"/>
           </a:xfrm>
           <a:prstGeom prst="straightConnector1">
             <a:avLst/>
           </a:prstGeom>
-          <a:ln w="19050">
+          <a:ln w="12700">
             <a:solidFill>
               <a:schemeClr val="tx1"/>
             </a:solidFill>
@@ -4627,14 +4807,14 @@
           <p:nvPr/>
         </p:nvCxnSpPr>
         <p:spPr>
-          <a:xfrm>
-            <a:off x="6095999" y="4202618"/>
-            <a:ext cx="469930" cy="536290"/>
+          <a:xfrm flipH="1">
+            <a:off x="6089679" y="4202618"/>
+            <a:ext cx="6320" cy="536290"/>
           </a:xfrm>
           <a:prstGeom prst="straightConnector1">
             <a:avLst/>
           </a:prstGeom>
-          <a:ln w="19050">
+          <a:ln w="12700">
             <a:solidFill>
               <a:schemeClr val="tx1"/>
             </a:solidFill>
@@ -4679,7 +4859,7 @@
           <a:prstGeom prst="straightConnector1">
             <a:avLst/>
           </a:prstGeom>
-          <a:ln w="19050">
+          <a:ln w="12700">
             <a:solidFill>
               <a:schemeClr val="tx1"/>
             </a:solidFill>
@@ -4718,14 +4898,14 @@
           <p:nvPr/>
         </p:nvCxnSpPr>
         <p:spPr>
-          <a:xfrm>
-            <a:off x="3909483" y="4183253"/>
-            <a:ext cx="1198" cy="554899"/>
+          <a:xfrm flipH="1">
+            <a:off x="3434431" y="4183253"/>
+            <a:ext cx="475052" cy="554899"/>
           </a:xfrm>
           <a:prstGeom prst="straightConnector1">
             <a:avLst/>
           </a:prstGeom>
-          <a:ln w="19050">
+          <a:ln w="12700">
             <a:solidFill>
               <a:schemeClr val="tx1"/>
             </a:solidFill>
@@ -4764,18 +4944,18 @@
           <p:nvPr/>
         </p:nvCxnSpPr>
         <p:spPr>
-          <a:xfrm flipH="1">
-            <a:off x="9145650" y="2651525"/>
-            <a:ext cx="485675" cy="3402635"/>
+          <a:xfrm>
+            <a:off x="9631325" y="2651525"/>
+            <a:ext cx="12700" cy="3402635"/>
           </a:xfrm>
           <a:prstGeom prst="bentConnector3">
             <a:avLst>
-              <a:gd name="adj1" fmla="val -390088"/>
+              <a:gd name="adj1" fmla="val 15045283"/>
             </a:avLst>
           </a:prstGeom>
           <a:ln w="31750">
             <a:solidFill>
-              <a:srgbClr val="00B050"/>
+              <a:srgbClr val="064578"/>
             </a:solidFill>
             <a:tailEnd type="triangle"/>
           </a:ln>
@@ -4807,18 +4987,19 @@
           <p:cNvCxnSpPr>
             <a:cxnSpLocks/>
             <a:stCxn id="7" idx="2"/>
+            <a:endCxn id="14" idx="0"/>
           </p:cNvCxnSpPr>
           <p:nvPr/>
         </p:nvCxnSpPr>
         <p:spPr>
           <a:xfrm flipH="1">
-            <a:off x="4768825" y="4202618"/>
-            <a:ext cx="1327174" cy="486973"/>
+            <a:off x="3434431" y="4202618"/>
+            <a:ext cx="2661568" cy="535534"/>
           </a:xfrm>
           <a:prstGeom prst="straightConnector1">
             <a:avLst/>
           </a:prstGeom>
-          <a:ln w="19050">
+          <a:ln w="12700">
             <a:solidFill>
               <a:schemeClr val="tx1"/>
             </a:solidFill>
@@ -4854,8 +5035,8 @@
         </p:nvSpPr>
         <p:spPr>
           <a:xfrm>
-            <a:off x="2860158" y="4570056"/>
-            <a:ext cx="4259986" cy="947064"/>
+            <a:off x="2504330" y="4593790"/>
+            <a:ext cx="3997013" cy="923330"/>
           </a:xfrm>
           <a:prstGeom prst="rect">
             <a:avLst/>
@@ -4907,8 +5088,8 @@
         </p:nvSpPr>
         <p:spPr>
           <a:xfrm>
-            <a:off x="426354" y="5052469"/>
-            <a:ext cx="1869694" cy="646331"/>
+            <a:off x="930054" y="4595935"/>
+            <a:ext cx="1229080" cy="923330"/>
           </a:xfrm>
           <a:prstGeom prst="rect">
             <a:avLst/>
@@ -4923,12 +5104,8 @@
           <a:p>
             <a:pPr algn="ctr"/>
             <a:r>
-              <a:rPr lang="en-US" dirty="0">
-                <a:solidFill>
-                  <a:srgbClr val="1E22AA"/>
-                </a:solidFill>
-              </a:rPr>
-              <a:t>IHE “Gateway” Actors Defined</a:t>
+              <a:rPr lang="en-US" dirty="0"/>
+              <a:t>“Gateway” Actors Defined</a:t>
             </a:r>
           </a:p>
         </p:txBody>
@@ -4951,8 +5128,8 @@
         </p:nvCxnSpPr>
         <p:spPr>
           <a:xfrm flipV="1">
-            <a:off x="2296048" y="5043588"/>
-            <a:ext cx="564110" cy="332047"/>
+            <a:off x="2159134" y="5055455"/>
+            <a:ext cx="345196" cy="2145"/>
           </a:xfrm>
           <a:prstGeom prst="straightConnector1">
             <a:avLst/>
@@ -4960,6 +5137,138 @@
           <a:ln w="19050">
             <a:solidFill>
               <a:schemeClr val="tx1"/>
+            </a:solidFill>
+            <a:tailEnd type="triangle"/>
+          </a:ln>
+        </p:spPr>
+        <p:style>
+          <a:lnRef idx="1">
+            <a:schemeClr val="accent1"/>
+          </a:lnRef>
+          <a:fillRef idx="0">
+            <a:schemeClr val="accent1"/>
+          </a:fillRef>
+          <a:effectRef idx="0">
+            <a:schemeClr val="accent1"/>
+          </a:effectRef>
+          <a:fontRef idx="minor">
+            <a:schemeClr val="tx1"/>
+          </a:fontRef>
+        </p:style>
+      </p:cxnSp>
+      <p:cxnSp>
+        <p:nvCxnSpPr>
+          <p:cNvPr id="92" name="Straight Arrow Connector 91">
+            <a:extLst>
+              <a:ext uri="{FF2B5EF4-FFF2-40B4-BE49-F238E27FC236}">
+                <a16:creationId xmlns:a16="http://schemas.microsoft.com/office/drawing/2014/main" id="{5CEB89E3-06D7-CEA5-34A0-D038C8EE2F25}"/>
+              </a:ext>
+            </a:extLst>
+          </p:cNvPr>
+          <p:cNvCxnSpPr>
+            <a:cxnSpLocks/>
+          </p:cNvCxnSpPr>
+          <p:nvPr/>
+        </p:nvCxnSpPr>
+        <p:spPr>
+          <a:xfrm flipH="1" flipV="1">
+            <a:off x="9396065" y="4375660"/>
+            <a:ext cx="482199" cy="331029"/>
+          </a:xfrm>
+          <a:prstGeom prst="straightConnector1">
+            <a:avLst/>
+          </a:prstGeom>
+          <a:ln w="19050">
+            <a:solidFill>
+              <a:srgbClr val="92D050"/>
+            </a:solidFill>
+            <a:tailEnd type="triangle"/>
+          </a:ln>
+        </p:spPr>
+        <p:style>
+          <a:lnRef idx="1">
+            <a:schemeClr val="accent1"/>
+          </a:lnRef>
+          <a:fillRef idx="0">
+            <a:schemeClr val="accent1"/>
+          </a:fillRef>
+          <a:effectRef idx="0">
+            <a:schemeClr val="accent1"/>
+          </a:effectRef>
+          <a:fontRef idx="minor">
+            <a:schemeClr val="tx1"/>
+          </a:fontRef>
+        </p:style>
+      </p:cxnSp>
+      <p:cxnSp>
+        <p:nvCxnSpPr>
+          <p:cNvPr id="93" name="Straight Arrow Connector 92">
+            <a:extLst>
+              <a:ext uri="{FF2B5EF4-FFF2-40B4-BE49-F238E27FC236}">
+                <a16:creationId xmlns:a16="http://schemas.microsoft.com/office/drawing/2014/main" id="{AC5C2B61-46C3-C616-BCA7-B9A10B5F09BB}"/>
+              </a:ext>
+            </a:extLst>
+          </p:cNvPr>
+          <p:cNvCxnSpPr>
+            <a:cxnSpLocks/>
+          </p:cNvCxnSpPr>
+          <p:nvPr/>
+        </p:nvCxnSpPr>
+        <p:spPr>
+          <a:xfrm flipH="1">
+            <a:off x="9607488" y="4942936"/>
+            <a:ext cx="270776" cy="155316"/>
+          </a:xfrm>
+          <a:prstGeom prst="straightConnector1">
+            <a:avLst/>
+          </a:prstGeom>
+          <a:ln w="19050">
+            <a:solidFill>
+              <a:srgbClr val="92D050"/>
+            </a:solidFill>
+            <a:tailEnd type="triangle"/>
+          </a:ln>
+        </p:spPr>
+        <p:style>
+          <a:lnRef idx="1">
+            <a:schemeClr val="accent1"/>
+          </a:lnRef>
+          <a:fillRef idx="0">
+            <a:schemeClr val="accent1"/>
+          </a:fillRef>
+          <a:effectRef idx="0">
+            <a:schemeClr val="accent1"/>
+          </a:effectRef>
+          <a:fontRef idx="minor">
+            <a:schemeClr val="tx1"/>
+          </a:fontRef>
+        </p:style>
+      </p:cxnSp>
+      <p:cxnSp>
+        <p:nvCxnSpPr>
+          <p:cNvPr id="97" name="Straight Arrow Connector 96">
+            <a:extLst>
+              <a:ext uri="{FF2B5EF4-FFF2-40B4-BE49-F238E27FC236}">
+                <a16:creationId xmlns:a16="http://schemas.microsoft.com/office/drawing/2014/main" id="{EC904554-3D84-10F8-CA85-74E78FE4AF50}"/>
+              </a:ext>
+            </a:extLst>
+          </p:cNvPr>
+          <p:cNvCxnSpPr>
+            <a:cxnSpLocks/>
+          </p:cNvCxnSpPr>
+          <p:nvPr/>
+        </p:nvCxnSpPr>
+        <p:spPr>
+          <a:xfrm>
+            <a:off x="8284265" y="4493555"/>
+            <a:ext cx="7070" cy="213134"/>
+          </a:xfrm>
+          <a:prstGeom prst="straightConnector1">
+            <a:avLst/>
+          </a:prstGeom>
+          <a:ln w="31750">
+            <a:solidFill>
+              <a:srgbClr val="064578"/>
             </a:solidFill>
             <a:tailEnd type="triangle"/>
           </a:ln>
@@ -5992,7 +6301,7 @@
                                 </p:cTn>
                               </p:par>
                               <p:par>
-                                <p:cTn id="91" presetID="22" presetClass="entr" presetSubtype="4" fill="hold" nodeType="withEffect">
+                                <p:cTn id="91" presetID="22" presetClass="entr" presetSubtype="4" fill="hold" grpId="0" nodeType="withEffect">
                                   <p:stCondLst>
                                     <p:cond delay="0"/>
                                   </p:stCondLst>
@@ -6000,41 +6309,6 @@
                                     <p:set>
                                       <p:cBhvr>
                                         <p:cTn id="92" dur="1" fill="hold">
-                                          <p:stCondLst>
-                                            <p:cond delay="0"/>
-                                          </p:stCondLst>
-                                        </p:cTn>
-                                        <p:tgtEl>
-                                          <p:spTgt spid="21"/>
-                                        </p:tgtEl>
-                                        <p:attrNameLst>
-                                          <p:attrName>style.visibility</p:attrName>
-                                        </p:attrNameLst>
-                                      </p:cBhvr>
-                                      <p:to>
-                                        <p:strVal val="visible"/>
-                                      </p:to>
-                                    </p:set>
-                                    <p:animEffect transition="in" filter="wipe(down)">
-                                      <p:cBhvr>
-                                        <p:cTn id="93" dur="500"/>
-                                        <p:tgtEl>
-                                          <p:spTgt spid="21"/>
-                                        </p:tgtEl>
-                                      </p:cBhvr>
-                                    </p:animEffect>
-                                  </p:childTnLst>
-                                </p:cTn>
-                              </p:par>
-                              <p:par>
-                                <p:cTn id="94" presetID="22" presetClass="entr" presetSubtype="4" fill="hold" grpId="0" nodeType="withEffect">
-                                  <p:stCondLst>
-                                    <p:cond delay="0"/>
-                                  </p:stCondLst>
-                                  <p:childTnLst>
-                                    <p:set>
-                                      <p:cBhvr>
-                                        <p:cTn id="95" dur="1" fill="hold">
                                           <p:stCondLst>
                                             <p:cond delay="0"/>
                                           </p:stCondLst>
@@ -6052,7 +6326,7 @@
                                     </p:set>
                                     <p:animEffect transition="in" filter="wipe(down)">
                                       <p:cBhvr>
-                                        <p:cTn id="96" dur="500"/>
+                                        <p:cTn id="93" dur="500"/>
                                         <p:tgtEl>
                                           <p:spTgt spid="16"/>
                                         </p:tgtEl>
@@ -6062,14 +6336,14 @@
                                 </p:cTn>
                               </p:par>
                               <p:par>
-                                <p:cTn id="97" presetID="22" presetClass="entr" presetSubtype="4" fill="hold" nodeType="withEffect">
+                                <p:cTn id="94" presetID="22" presetClass="entr" presetSubtype="4" fill="hold" nodeType="withEffect">
                                   <p:stCondLst>
                                     <p:cond delay="0"/>
                                   </p:stCondLst>
                                   <p:childTnLst>
                                     <p:set>
                                       <p:cBhvr>
-                                        <p:cTn id="98" dur="1" fill="hold">
+                                        <p:cTn id="95" dur="1" fill="hold">
                                           <p:stCondLst>
                                             <p:cond delay="0"/>
                                           </p:stCondLst>
@@ -6087,7 +6361,7 @@
                                     </p:set>
                                     <p:animEffect transition="in" filter="wipe(down)">
                                       <p:cBhvr>
-                                        <p:cTn id="99" dur="500"/>
+                                        <p:cTn id="96" dur="500"/>
                                         <p:tgtEl>
                                           <p:spTgt spid="22"/>
                                         </p:tgtEl>
@@ -6097,14 +6371,14 @@
                                 </p:cTn>
                               </p:par>
                               <p:par>
-                                <p:cTn id="100" presetID="22" presetClass="entr" presetSubtype="4" fill="hold" grpId="0" nodeType="withEffect">
+                                <p:cTn id="97" presetID="22" presetClass="entr" presetSubtype="4" fill="hold" grpId="0" nodeType="withEffect">
                                   <p:stCondLst>
                                     <p:cond delay="0"/>
                                   </p:stCondLst>
                                   <p:childTnLst>
                                     <p:set>
                                       <p:cBhvr>
-                                        <p:cTn id="101" dur="1" fill="hold">
+                                        <p:cTn id="98" dur="1" fill="hold">
                                           <p:stCondLst>
                                             <p:cond delay="0"/>
                                           </p:stCondLst>
@@ -6122,9 +6396,44 @@
                                     </p:set>
                                     <p:animEffect transition="in" filter="wipe(down)">
                                       <p:cBhvr>
+                                        <p:cTn id="99" dur="500"/>
+                                        <p:tgtEl>
+                                          <p:spTgt spid="13"/>
+                                        </p:tgtEl>
+                                      </p:cBhvr>
+                                    </p:animEffect>
+                                  </p:childTnLst>
+                                </p:cTn>
+                              </p:par>
+                              <p:par>
+                                <p:cTn id="100" presetID="22" presetClass="entr" presetSubtype="4" fill="hold" nodeType="withEffect">
+                                  <p:stCondLst>
+                                    <p:cond delay="0"/>
+                                  </p:stCondLst>
+                                  <p:childTnLst>
+                                    <p:set>
+                                      <p:cBhvr>
+                                        <p:cTn id="101" dur="1" fill="hold">
+                                          <p:stCondLst>
+                                            <p:cond delay="0"/>
+                                          </p:stCondLst>
+                                        </p:cTn>
+                                        <p:tgtEl>
+                                          <p:spTgt spid="92"/>
+                                        </p:tgtEl>
+                                        <p:attrNameLst>
+                                          <p:attrName>style.visibility</p:attrName>
+                                        </p:attrNameLst>
+                                      </p:cBhvr>
+                                      <p:to>
+                                        <p:strVal val="visible"/>
+                                      </p:to>
+                                    </p:set>
+                                    <p:animEffect transition="in" filter="wipe(down)">
+                                      <p:cBhvr>
                                         <p:cTn id="102" dur="500"/>
                                         <p:tgtEl>
-                                          <p:spTgt spid="13"/>
+                                          <p:spTgt spid="92"/>
                                         </p:tgtEl>
                                       </p:cBhvr>
                                     </p:animEffect>
@@ -6145,7 +6454,7 @@
                                           </p:stCondLst>
                                         </p:cTn>
                                         <p:tgtEl>
-                                          <p:spTgt spid="12"/>
+                                          <p:spTgt spid="93"/>
                                         </p:tgtEl>
                                         <p:attrNameLst>
                                           <p:attrName>style.visibility</p:attrName>
@@ -6159,7 +6468,7 @@
                                       <p:cBhvr>
                                         <p:cTn id="105" dur="500"/>
                                         <p:tgtEl>
-                                          <p:spTgt spid="12"/>
+                                          <p:spTgt spid="93"/>
                                         </p:tgtEl>
                                       </p:cBhvr>
                                     </p:animEffect>
@@ -6180,7 +6489,7 @@
                                           </p:stCondLst>
                                         </p:cTn>
                                         <p:tgtEl>
-                                          <p:spTgt spid="20"/>
+                                          <p:spTgt spid="97"/>
                                         </p:tgtEl>
                                         <p:attrNameLst>
                                           <p:attrName>style.visibility</p:attrName>
@@ -6194,7 +6503,7 @@
                                       <p:cBhvr>
                                         <p:cTn id="108" dur="500"/>
                                         <p:tgtEl>
-                                          <p:spTgt spid="20"/>
+                                          <p:spTgt spid="97"/>
                                         </p:tgtEl>
                                       </p:cBhvr>
                                     </p:animEffect>
@@ -6543,4 +6852,10 @@
     </a:ext>
   </a:extLst>
 </a:theme>
+</file>
+
+<file path=docMetadata/LabelInfo.xml><?xml version="1.0" encoding="utf-8"?>
+<clbl:labelList xmlns:clbl="http://schemas.microsoft.com/office/2020/mipLabelMetadata">
+  <clbl:label id="{1a407a2d-7675-4d17-8692-b3ac285306e4}" enabled="0" method="" siteId="{1a407a2d-7675-4d17-8692-b3ac285306e4}" removed="1"/>
+</clbl:labelList>
 </file>
</xml_diff>